<commit_message>
aggiunto gli elementi in malo modo
</commit_message>
<xml_diff>
--- a/Competitors_modificato_pandas.pptx
+++ b/Competitors_modificato_pandas.pptx
@@ -5338,6 +5338,7 @@
           </a:bodyPr>
           <a:lstStyle/>
           <a:p>
+            <a:pPr algn="ctr"/>
             <a:r>
               <a:rPr sz="1050" b="0" i="0">
                 <a:solidFill>
@@ -5372,6 +5373,7 @@
           </a:bodyPr>
           <a:lstStyle/>
           <a:p>
+            <a:pPr algn="ctr"/>
             <a:r>
               <a:rPr sz="1050" b="0" i="0">
                 <a:solidFill>
@@ -5406,6 +5408,7 @@
           </a:bodyPr>
           <a:lstStyle/>
           <a:p>
+            <a:pPr algn="ctr"/>
             <a:r>
               <a:rPr sz="1050" b="0" i="0">
                 <a:solidFill>
@@ -5440,6 +5443,7 @@
           </a:bodyPr>
           <a:lstStyle/>
           <a:p>
+            <a:pPr algn="ctr"/>
             <a:r>
               <a:rPr sz="900" b="0" i="0">
                 <a:solidFill>
@@ -5475,6 +5479,7 @@
           </a:bodyPr>
           <a:lstStyle/>
           <a:p>
+            <a:pPr algn="ctr"/>
             <a:r>
               <a:rPr sz="900" b="0" i="0">
                 <a:solidFill>
@@ -5510,6 +5515,7 @@
           </a:bodyPr>
           <a:lstStyle/>
           <a:p>
+            <a:pPr algn="ctr"/>
             <a:r>
               <a:rPr sz="900" b="0" i="0">
                 <a:solidFill>
@@ -5545,6 +5551,7 @@
           </a:bodyPr>
           <a:lstStyle/>
           <a:p>
+            <a:pPr algn="ctr"/>
             <a:r>
               <a:rPr sz="900" b="0" i="0">
                 <a:solidFill>
@@ -5580,6 +5587,7 @@
           </a:bodyPr>
           <a:lstStyle/>
           <a:p>
+            <a:pPr algn="ctr"/>
             <a:r>
               <a:rPr sz="900" b="0" i="0">
                 <a:solidFill>
@@ -5615,6 +5623,7 @@
           </a:bodyPr>
           <a:lstStyle/>
           <a:p>
+            <a:pPr algn="ctr"/>
             <a:r>
               <a:rPr sz="900" b="0" i="0">
                 <a:solidFill>
@@ -5650,6 +5659,7 @@
           </a:bodyPr>
           <a:lstStyle/>
           <a:p>
+            <a:pPr algn="ctr"/>
             <a:r>
               <a:rPr sz="1050" b="0" i="0">
                 <a:solidFill>
@@ -5684,6 +5694,7 @@
           </a:bodyPr>
           <a:lstStyle/>
           <a:p>
+            <a:pPr algn="ctr"/>
             <a:r>
               <a:rPr sz="1050" b="0" i="0">
                 <a:solidFill>
@@ -5718,6 +5729,7 @@
           </a:bodyPr>
           <a:lstStyle/>
           <a:p>
+            <a:pPr algn="ctr"/>
             <a:r>
               <a:rPr sz="1050" b="0" i="0">
                 <a:solidFill>
@@ -5752,6 +5764,7 @@
           </a:bodyPr>
           <a:lstStyle/>
           <a:p>
+            <a:pPr algn="ctr"/>
             <a:r>
               <a:rPr sz="900" b="0" i="0">
                 <a:solidFill>
@@ -5787,6 +5800,7 @@
           </a:bodyPr>
           <a:lstStyle/>
           <a:p>
+            <a:pPr algn="ctr"/>
             <a:r>
               <a:rPr sz="900" b="0" i="0">
                 <a:solidFill>
@@ -5822,6 +5836,7 @@
           </a:bodyPr>
           <a:lstStyle/>
           <a:p>
+            <a:pPr algn="ctr"/>
             <a:r>
               <a:rPr sz="900" b="0" i="0">
                 <a:solidFill>
@@ -5857,6 +5872,7 @@
           </a:bodyPr>
           <a:lstStyle/>
           <a:p>
+            <a:pPr algn="ctr"/>
             <a:r>
               <a:rPr sz="900" b="0" i="0">
                 <a:solidFill>
@@ -5892,6 +5908,7 @@
           </a:bodyPr>
           <a:lstStyle/>
           <a:p>
+            <a:pPr algn="ctr"/>
             <a:r>
               <a:rPr sz="900" b="0" i="0">
                 <a:solidFill>
@@ -5927,6 +5944,7 @@
           </a:bodyPr>
           <a:lstStyle/>
           <a:p>
+            <a:pPr algn="ctr"/>
             <a:r>
               <a:rPr sz="900" b="0" i="0">
                 <a:solidFill>
@@ -5962,6 +5980,7 @@
           </a:bodyPr>
           <a:lstStyle/>
           <a:p>
+            <a:pPr algn="ctr"/>
             <a:r>
               <a:rPr sz="1050" b="0" i="0">
                 <a:solidFill>
@@ -5996,6 +6015,7 @@
           </a:bodyPr>
           <a:lstStyle/>
           <a:p>
+            <a:pPr algn="ctr"/>
             <a:r>
               <a:rPr sz="1050" b="0" i="0">
                 <a:solidFill>
@@ -6030,6 +6050,7 @@
           </a:bodyPr>
           <a:lstStyle/>
           <a:p>
+            <a:pPr algn="ctr"/>
             <a:r>
               <a:rPr sz="1050" b="0" i="0">
                 <a:solidFill>
@@ -6064,6 +6085,7 @@
           </a:bodyPr>
           <a:lstStyle/>
           <a:p>
+            <a:pPr algn="ctr"/>
             <a:r>
               <a:rPr sz="900" b="0" i="0">
                 <a:solidFill>
@@ -6099,6 +6121,7 @@
           </a:bodyPr>
           <a:lstStyle/>
           <a:p>
+            <a:pPr algn="ctr"/>
             <a:r>
               <a:rPr sz="900" b="0" i="0">
                 <a:solidFill>
@@ -6134,6 +6157,7 @@
           </a:bodyPr>
           <a:lstStyle/>
           <a:p>
+            <a:pPr algn="ctr"/>
             <a:r>
               <a:rPr sz="900" b="0" i="0">
                 <a:solidFill>
@@ -6169,6 +6193,7 @@
           </a:bodyPr>
           <a:lstStyle/>
           <a:p>
+            <a:pPr algn="ctr"/>
             <a:r>
               <a:rPr sz="900" b="0" i="0">
                 <a:solidFill>
@@ -6204,6 +6229,7 @@
           </a:bodyPr>
           <a:lstStyle/>
           <a:p>
+            <a:pPr algn="ctr"/>
             <a:r>
               <a:rPr sz="900" b="0" i="0">
                 <a:solidFill>
@@ -6239,6 +6265,7 @@
           </a:bodyPr>
           <a:lstStyle/>
           <a:p>
+            <a:pPr algn="ctr"/>
             <a:r>
               <a:rPr sz="900" b="0" i="0">
                 <a:solidFill>
@@ -6274,6 +6301,7 @@
           </a:bodyPr>
           <a:lstStyle/>
           <a:p>
+            <a:pPr algn="ctr"/>
             <a:r>
               <a:rPr sz="1050" b="0" i="0">
                 <a:solidFill>
@@ -6308,6 +6336,7 @@
           </a:bodyPr>
           <a:lstStyle/>
           <a:p>
+            <a:pPr algn="ctr"/>
             <a:r>
               <a:rPr sz="1050" b="0" i="0">
                 <a:solidFill>
@@ -6342,6 +6371,7 @@
           </a:bodyPr>
           <a:lstStyle/>
           <a:p>
+            <a:pPr algn="ctr"/>
             <a:r>
               <a:rPr sz="1050" b="0" i="0">
                 <a:solidFill>
@@ -6376,6 +6406,7 @@
           </a:bodyPr>
           <a:lstStyle/>
           <a:p>
+            <a:pPr algn="ctr"/>
             <a:r>
               <a:rPr sz="900" b="0" i="0">
                 <a:solidFill>
@@ -6411,6 +6442,7 @@
           </a:bodyPr>
           <a:lstStyle/>
           <a:p>
+            <a:pPr algn="ctr"/>
             <a:r>
               <a:rPr sz="900" b="0" i="0">
                 <a:solidFill>
@@ -6446,6 +6478,7 @@
           </a:bodyPr>
           <a:lstStyle/>
           <a:p>
+            <a:pPr algn="ctr"/>
             <a:r>
               <a:rPr sz="900" b="0" i="0">
                 <a:solidFill>
@@ -6481,6 +6514,7 @@
           </a:bodyPr>
           <a:lstStyle/>
           <a:p>
+            <a:pPr algn="ctr"/>
             <a:r>
               <a:rPr sz="900" b="0" i="0">
                 <a:solidFill>
@@ -6516,6 +6550,7 @@
           </a:bodyPr>
           <a:lstStyle/>
           <a:p>
+            <a:pPr algn="ctr"/>
             <a:r>
               <a:rPr sz="900" b="0" i="0">
                 <a:solidFill>
@@ -6551,6 +6586,7 @@
           </a:bodyPr>
           <a:lstStyle/>
           <a:p>
+            <a:pPr algn="ctr"/>
             <a:r>
               <a:rPr sz="900" b="0" i="0">
                 <a:solidFill>
@@ -6586,6 +6622,7 @@
           </a:bodyPr>
           <a:lstStyle/>
           <a:p>
+            <a:pPr algn="ctr"/>
             <a:r>
               <a:rPr sz="1050" b="0" i="0">
                 <a:solidFill>
@@ -6620,6 +6657,7 @@
           </a:bodyPr>
           <a:lstStyle/>
           <a:p>
+            <a:pPr algn="ctr"/>
             <a:r>
               <a:rPr sz="1050" b="0" i="0">
                 <a:solidFill>
@@ -6654,6 +6692,7 @@
           </a:bodyPr>
           <a:lstStyle/>
           <a:p>
+            <a:pPr algn="ctr"/>
             <a:r>
               <a:rPr sz="1050" b="0" i="0">
                 <a:solidFill>
@@ -6688,6 +6727,7 @@
           </a:bodyPr>
           <a:lstStyle/>
           <a:p>
+            <a:pPr algn="ctr"/>
             <a:r>
               <a:rPr sz="900" b="0" i="0">
                 <a:solidFill>
@@ -6723,6 +6763,7 @@
           </a:bodyPr>
           <a:lstStyle/>
           <a:p>
+            <a:pPr algn="ctr"/>
             <a:r>
               <a:rPr sz="900" b="0" i="0">
                 <a:solidFill>
@@ -6758,6 +6799,7 @@
           </a:bodyPr>
           <a:lstStyle/>
           <a:p>
+            <a:pPr algn="ctr"/>
             <a:r>
               <a:rPr sz="900" b="0" i="0">
                 <a:solidFill>
@@ -6793,6 +6835,7 @@
           </a:bodyPr>
           <a:lstStyle/>
           <a:p>
+            <a:pPr algn="ctr"/>
             <a:r>
               <a:rPr sz="900" b="0" i="0">
                 <a:solidFill>
@@ -6828,6 +6871,7 @@
           </a:bodyPr>
           <a:lstStyle/>
           <a:p>
+            <a:pPr algn="ctr"/>
             <a:r>
               <a:rPr sz="900" b="0" i="0">
                 <a:solidFill>
@@ -6863,6 +6907,7 @@
           </a:bodyPr>
           <a:lstStyle/>
           <a:p>
+            <a:pPr algn="ctr"/>
             <a:r>
               <a:rPr sz="900" b="0" i="0">
                 <a:solidFill>
@@ -6898,6 +6943,7 @@
           </a:bodyPr>
           <a:lstStyle/>
           <a:p>
+            <a:pPr algn="ctr"/>
             <a:r>
               <a:rPr sz="1050" b="0" i="0">
                 <a:solidFill>
@@ -6932,6 +6978,7 @@
           </a:bodyPr>
           <a:lstStyle/>
           <a:p>
+            <a:pPr algn="ctr"/>
             <a:r>
               <a:rPr sz="1050" b="0" i="0">
                 <a:solidFill>
@@ -6966,6 +7013,7 @@
           </a:bodyPr>
           <a:lstStyle/>
           <a:p>
+            <a:pPr algn="ctr"/>
             <a:r>
               <a:rPr sz="1050" b="0" i="0">
                 <a:solidFill>
@@ -7000,6 +7048,7 @@
           </a:bodyPr>
           <a:lstStyle/>
           <a:p>
+            <a:pPr algn="ctr"/>
             <a:r>
               <a:rPr sz="900" b="0" i="0">
                 <a:solidFill>
@@ -7035,6 +7084,7 @@
           </a:bodyPr>
           <a:lstStyle/>
           <a:p>
+            <a:pPr algn="ctr"/>
             <a:r>
               <a:rPr sz="900" b="0" i="0">
                 <a:solidFill>
@@ -7070,6 +7120,7 @@
           </a:bodyPr>
           <a:lstStyle/>
           <a:p>
+            <a:pPr algn="ctr"/>
             <a:r>
               <a:rPr sz="900" b="0" i="0">
                 <a:solidFill>
@@ -7105,6 +7156,7 @@
           </a:bodyPr>
           <a:lstStyle/>
           <a:p>
+            <a:pPr algn="ctr"/>
             <a:r>
               <a:rPr sz="900" b="0" i="0">
                 <a:solidFill>
@@ -7140,6 +7192,7 @@
           </a:bodyPr>
           <a:lstStyle/>
           <a:p>
+            <a:pPr algn="ctr"/>
             <a:r>
               <a:rPr sz="900" b="0" i="0">
                 <a:solidFill>
@@ -7175,6 +7228,7 @@
           </a:bodyPr>
           <a:lstStyle/>
           <a:p>
+            <a:pPr algn="ctr"/>
             <a:r>
               <a:rPr sz="900" b="0" i="0">
                 <a:solidFill>
@@ -7219,6 +7273,612 @@
         </p:nvSpPr>
         <p:spPr>
           <a:xfrm>
+            <a:off x="388800" y="813600"/>
+            <a:ext cx="1119600" cy="302400"/>
+          </a:xfrm>
+          <a:prstGeom prst="rect">
+            <a:avLst/>
+          </a:prstGeom>
+          <a:noFill/>
+        </p:spPr>
+        <p:txBody>
+          <a:bodyPr wrap="square">
+            <a:noAutofit/>
+          </a:bodyPr>
+          <a:lstStyle/>
+          <a:p>
+            <a:pPr algn="ctr"/>
+            <a:r>
+              <a:rPr sz="1400" b="1" i="0">
+                <a:solidFill>
+                  <a:srgbClr val="000000"/>
+                </a:solidFill>
+                <a:latin typeface="Calibri"/>
+              </a:rPr>
+              <a:t>Società</a:t>
+            </a:r>
+          </a:p>
+        </p:txBody>
+      </p:sp>
+      <p:sp>
+        <p:nvSpPr>
+          <p:cNvPr id="3" name="TextBox 2"/>
+          <p:cNvSpPr txBox="1"/>
+          <p:nvPr/>
+        </p:nvSpPr>
+        <p:spPr>
+          <a:xfrm>
+            <a:off x="1688400" y="813600"/>
+            <a:ext cx="1119600" cy="302400"/>
+          </a:xfrm>
+          <a:prstGeom prst="rect">
+            <a:avLst/>
+          </a:prstGeom>
+          <a:noFill/>
+        </p:spPr>
+        <p:txBody>
+          <a:bodyPr wrap="square">
+            <a:noAutofit/>
+          </a:bodyPr>
+          <a:lstStyle/>
+          <a:p>
+            <a:pPr algn="ctr"/>
+            <a:r>
+              <a:rPr sz="1400" b="1" i="0">
+                <a:solidFill>
+                  <a:srgbClr val="000000"/>
+                </a:solidFill>
+                <a:latin typeface="Calibri"/>
+              </a:rPr>
+              <a:t>Logo</a:t>
+            </a:r>
+          </a:p>
+        </p:txBody>
+      </p:sp>
+      <p:sp>
+        <p:nvSpPr>
+          <p:cNvPr id="4" name="TextBox 3"/>
+          <p:cNvSpPr txBox="1"/>
+          <p:nvPr/>
+        </p:nvSpPr>
+        <p:spPr>
+          <a:xfrm>
+            <a:off x="2984400" y="813600"/>
+            <a:ext cx="1119600" cy="302400"/>
+          </a:xfrm>
+          <a:prstGeom prst="rect">
+            <a:avLst/>
+          </a:prstGeom>
+          <a:noFill/>
+        </p:spPr>
+        <p:txBody>
+          <a:bodyPr wrap="square">
+            <a:noAutofit/>
+          </a:bodyPr>
+          <a:lstStyle/>
+          <a:p>
+            <a:pPr algn="ctr"/>
+            <a:r>
+              <a:rPr sz="1400" b="1" i="0">
+                <a:solidFill>
+                  <a:srgbClr val="000000"/>
+                </a:solidFill>
+                <a:latin typeface="Calibri"/>
+              </a:rPr>
+              <a:t>Sede</a:t>
+            </a:r>
+          </a:p>
+        </p:txBody>
+      </p:sp>
+      <p:sp>
+        <p:nvSpPr>
+          <p:cNvPr id="5" name="TextBox 4"/>
+          <p:cNvSpPr txBox="1"/>
+          <p:nvPr/>
+        </p:nvSpPr>
+        <p:spPr>
+          <a:xfrm>
+            <a:off x="4719600" y="813600"/>
+            <a:ext cx="2548800" cy="302400"/>
+          </a:xfrm>
+          <a:prstGeom prst="rect">
+            <a:avLst/>
+          </a:prstGeom>
+          <a:noFill/>
+        </p:spPr>
+        <p:txBody>
+          <a:bodyPr wrap="square">
+            <a:noAutofit/>
+          </a:bodyPr>
+          <a:lstStyle/>
+          <a:p>
+            <a:pPr algn="ctr"/>
+            <a:r>
+              <a:rPr sz="1400" b="1" i="0">
+                <a:solidFill>
+                  <a:srgbClr val="000000"/>
+                </a:solidFill>
+                <a:latin typeface="Calibri"/>
+              </a:rPr>
+              <a:t>Descrizione dell'attività svolta</a:t>
+            </a:r>
+          </a:p>
+        </p:txBody>
+      </p:sp>
+      <p:sp>
+        <p:nvSpPr>
+          <p:cNvPr id="6" name="TextBox 5"/>
+          <p:cNvSpPr txBox="1"/>
+          <p:nvPr/>
+        </p:nvSpPr>
+        <p:spPr>
+          <a:xfrm>
+            <a:off x="8766000" y="813600"/>
+            <a:ext cx="2185200" cy="302400"/>
+          </a:xfrm>
+          <a:prstGeom prst="rect">
+            <a:avLst/>
+          </a:prstGeom>
+          <a:noFill/>
+        </p:spPr>
+        <p:txBody>
+          <a:bodyPr wrap="square">
+            <a:noAutofit/>
+          </a:bodyPr>
+          <a:lstStyle/>
+          <a:p>
+            <a:pPr algn="ctr"/>
+            <a:r>
+              <a:rPr sz="1400" b="1" i="0">
+                <a:solidFill>
+                  <a:srgbClr val="000000"/>
+                </a:solidFill>
+                <a:latin typeface="Calibri"/>
+              </a:rPr>
+              <a:t>Key Financials (€/k)</a:t>
+            </a:r>
+          </a:p>
+        </p:txBody>
+      </p:sp>
+      <p:sp>
+        <p:nvSpPr>
+          <p:cNvPr id="7" name="TextBox 6"/>
+          <p:cNvSpPr txBox="1"/>
+          <p:nvPr/>
+        </p:nvSpPr>
+        <p:spPr>
+          <a:xfrm>
+            <a:off x="342000" y="198000"/>
+            <a:ext cx="10656000" cy="363600"/>
+          </a:xfrm>
+          <a:prstGeom prst="rect">
+            <a:avLst/>
+          </a:prstGeom>
+          <a:noFill/>
+        </p:spPr>
+        <p:txBody>
+          <a:bodyPr wrap="square">
+            <a:noAutofit/>
+          </a:bodyPr>
+          <a:lstStyle/>
+          <a:p>
+            <a:pPr algn="l"/>
+            <a:r>
+              <a:rPr sz="2400" b="0" i="0">
+                <a:solidFill>
+                  <a:srgbClr val="000000"/>
+                </a:solidFill>
+                <a:latin typeface="Calibri"/>
+              </a:rPr>
+              <a:t>Competitors Analysis</a:t>
+            </a:r>
+          </a:p>
+        </p:txBody>
+      </p:sp>
+      <p:cxnSp>
+        <p:nvCxnSpPr>
+          <p:cNvPr id="8" name="Connector 7"/>
+          <p:cNvCxnSpPr/>
+          <p:nvPr/>
+        </p:nvCxnSpPr>
+        <p:spPr>
+          <a:xfrm>
+            <a:off x="435600" y="1893600"/>
+            <a:ext cx="11325600" cy="0"/>
+          </a:xfrm>
+          <a:prstGeom prst="line">
+            <a:avLst/>
+          </a:prstGeom>
+          <a:ln w="12700">
+            <a:solidFill>
+              <a:srgbClr val="969696"/>
+            </a:solidFill>
+          </a:ln>
+          <a:effectLst/>
+        </p:spPr>
+        <p:style>
+          <a:lnRef idx="2">
+            <a:schemeClr val="accent1"/>
+          </a:lnRef>
+          <a:fillRef idx="0">
+            <a:schemeClr val="accent1"/>
+          </a:fillRef>
+          <a:effectRef idx="1">
+            <a:schemeClr val="accent1"/>
+          </a:effectRef>
+          <a:fontRef idx="minor">
+            <a:schemeClr val="tx1"/>
+          </a:fontRef>
+        </p:style>
+      </p:cxnSp>
+      <p:cxnSp>
+        <p:nvCxnSpPr>
+          <p:cNvPr id="9" name="Connector 8"/>
+          <p:cNvCxnSpPr/>
+          <p:nvPr/>
+        </p:nvCxnSpPr>
+        <p:spPr>
+          <a:xfrm>
+            <a:off x="435600" y="2653200"/>
+            <a:ext cx="11325600" cy="0"/>
+          </a:xfrm>
+          <a:prstGeom prst="line">
+            <a:avLst/>
+          </a:prstGeom>
+          <a:ln w="12700">
+            <a:solidFill>
+              <a:srgbClr val="969696"/>
+            </a:solidFill>
+          </a:ln>
+          <a:effectLst/>
+        </p:spPr>
+        <p:style>
+          <a:lnRef idx="2">
+            <a:schemeClr val="accent1"/>
+          </a:lnRef>
+          <a:fillRef idx="0">
+            <a:schemeClr val="accent1"/>
+          </a:fillRef>
+          <a:effectRef idx="1">
+            <a:schemeClr val="accent1"/>
+          </a:effectRef>
+          <a:fontRef idx="minor">
+            <a:schemeClr val="tx1"/>
+          </a:fontRef>
+        </p:style>
+      </p:cxnSp>
+      <p:cxnSp>
+        <p:nvCxnSpPr>
+          <p:cNvPr id="10" name="Connector 9"/>
+          <p:cNvCxnSpPr/>
+          <p:nvPr/>
+        </p:nvCxnSpPr>
+        <p:spPr>
+          <a:xfrm>
+            <a:off x="435600" y="3412800"/>
+            <a:ext cx="11325600" cy="0"/>
+          </a:xfrm>
+          <a:prstGeom prst="line">
+            <a:avLst/>
+          </a:prstGeom>
+          <a:ln w="12700">
+            <a:solidFill>
+              <a:srgbClr val="969696"/>
+            </a:solidFill>
+          </a:ln>
+          <a:effectLst/>
+        </p:spPr>
+        <p:style>
+          <a:lnRef idx="2">
+            <a:schemeClr val="accent1"/>
+          </a:lnRef>
+          <a:fillRef idx="0">
+            <a:schemeClr val="accent1"/>
+          </a:fillRef>
+          <a:effectRef idx="1">
+            <a:schemeClr val="accent1"/>
+          </a:effectRef>
+          <a:fontRef idx="minor">
+            <a:schemeClr val="tx1"/>
+          </a:fontRef>
+        </p:style>
+      </p:cxnSp>
+      <p:cxnSp>
+        <p:nvCxnSpPr>
+          <p:cNvPr id="11" name="Connector 10"/>
+          <p:cNvCxnSpPr/>
+          <p:nvPr/>
+        </p:nvCxnSpPr>
+        <p:spPr>
+          <a:xfrm>
+            <a:off x="435600" y="4183200"/>
+            <a:ext cx="11325600" cy="0"/>
+          </a:xfrm>
+          <a:prstGeom prst="line">
+            <a:avLst/>
+          </a:prstGeom>
+          <a:ln w="12700">
+            <a:solidFill>
+              <a:srgbClr val="969696"/>
+            </a:solidFill>
+          </a:ln>
+          <a:effectLst/>
+        </p:spPr>
+        <p:style>
+          <a:lnRef idx="2">
+            <a:schemeClr val="accent1"/>
+          </a:lnRef>
+          <a:fillRef idx="0">
+            <a:schemeClr val="accent1"/>
+          </a:fillRef>
+          <a:effectRef idx="1">
+            <a:schemeClr val="accent1"/>
+          </a:effectRef>
+          <a:fontRef idx="minor">
+            <a:schemeClr val="tx1"/>
+          </a:fontRef>
+        </p:style>
+      </p:cxnSp>
+      <p:cxnSp>
+        <p:nvCxnSpPr>
+          <p:cNvPr id="12" name="Connector 11"/>
+          <p:cNvCxnSpPr/>
+          <p:nvPr/>
+        </p:nvCxnSpPr>
+        <p:spPr>
+          <a:xfrm>
+            <a:off x="435600" y="4975200"/>
+            <a:ext cx="11325600" cy="0"/>
+          </a:xfrm>
+          <a:prstGeom prst="line">
+            <a:avLst/>
+          </a:prstGeom>
+          <a:ln w="12700">
+            <a:solidFill>
+              <a:srgbClr val="969696"/>
+            </a:solidFill>
+          </a:ln>
+          <a:effectLst/>
+        </p:spPr>
+        <p:style>
+          <a:lnRef idx="2">
+            <a:schemeClr val="accent1"/>
+          </a:lnRef>
+          <a:fillRef idx="0">
+            <a:schemeClr val="accent1"/>
+          </a:fillRef>
+          <a:effectRef idx="1">
+            <a:schemeClr val="accent1"/>
+          </a:effectRef>
+          <a:fontRef idx="minor">
+            <a:schemeClr val="tx1"/>
+          </a:fontRef>
+        </p:style>
+      </p:cxnSp>
+      <p:cxnSp>
+        <p:nvCxnSpPr>
+          <p:cNvPr id="13" name="Connector 12"/>
+          <p:cNvCxnSpPr/>
+          <p:nvPr/>
+        </p:nvCxnSpPr>
+        <p:spPr>
+          <a:xfrm>
+            <a:off x="435600" y="5774400"/>
+            <a:ext cx="11325600" cy="0"/>
+          </a:xfrm>
+          <a:prstGeom prst="line">
+            <a:avLst/>
+          </a:prstGeom>
+          <a:ln w="12700">
+            <a:solidFill>
+              <a:srgbClr val="969696"/>
+            </a:solidFill>
+          </a:ln>
+          <a:effectLst/>
+        </p:spPr>
+        <p:style>
+          <a:lnRef idx="2">
+            <a:schemeClr val="accent1"/>
+          </a:lnRef>
+          <a:fillRef idx="0">
+            <a:schemeClr val="accent1"/>
+          </a:fillRef>
+          <a:effectRef idx="1">
+            <a:schemeClr val="accent1"/>
+          </a:effectRef>
+          <a:fontRef idx="minor">
+            <a:schemeClr val="tx1"/>
+          </a:fontRef>
+        </p:style>
+      </p:cxnSp>
+      <p:cxnSp>
+        <p:nvCxnSpPr>
+          <p:cNvPr id="14" name="Connector 13"/>
+          <p:cNvCxnSpPr/>
+          <p:nvPr/>
+        </p:nvCxnSpPr>
+        <p:spPr>
+          <a:xfrm>
+            <a:off x="345600" y="1105200"/>
+            <a:ext cx="1206000" cy="0"/>
+          </a:xfrm>
+          <a:prstGeom prst="line">
+            <a:avLst/>
+          </a:prstGeom>
+          <a:ln w="25400">
+            <a:solidFill>
+              <a:srgbClr val="000000"/>
+            </a:solidFill>
+          </a:ln>
+          <a:effectLst/>
+        </p:spPr>
+        <p:style>
+          <a:lnRef idx="2">
+            <a:schemeClr val="accent1"/>
+          </a:lnRef>
+          <a:fillRef idx="0">
+            <a:schemeClr val="accent1"/>
+          </a:fillRef>
+          <a:effectRef idx="1">
+            <a:schemeClr val="accent1"/>
+          </a:effectRef>
+          <a:fontRef idx="minor">
+            <a:schemeClr val="tx1"/>
+          </a:fontRef>
+        </p:style>
+      </p:cxnSp>
+      <p:cxnSp>
+        <p:nvCxnSpPr>
+          <p:cNvPr id="15" name="Connector 14"/>
+          <p:cNvCxnSpPr/>
+          <p:nvPr/>
+        </p:nvCxnSpPr>
+        <p:spPr>
+          <a:xfrm>
+            <a:off x="1645200" y="1105200"/>
+            <a:ext cx="1206000" cy="0"/>
+          </a:xfrm>
+          <a:prstGeom prst="line">
+            <a:avLst/>
+          </a:prstGeom>
+          <a:ln w="25400">
+            <a:solidFill>
+              <a:srgbClr val="000000"/>
+            </a:solidFill>
+          </a:ln>
+          <a:effectLst/>
+        </p:spPr>
+        <p:style>
+          <a:lnRef idx="2">
+            <a:schemeClr val="accent1"/>
+          </a:lnRef>
+          <a:fillRef idx="0">
+            <a:schemeClr val="accent1"/>
+          </a:fillRef>
+          <a:effectRef idx="1">
+            <a:schemeClr val="accent1"/>
+          </a:effectRef>
+          <a:fontRef idx="minor">
+            <a:schemeClr val="tx1"/>
+          </a:fontRef>
+        </p:style>
+      </p:cxnSp>
+      <p:cxnSp>
+        <p:nvCxnSpPr>
+          <p:cNvPr id="16" name="Connector 15"/>
+          <p:cNvCxnSpPr/>
+          <p:nvPr/>
+        </p:nvCxnSpPr>
+        <p:spPr>
+          <a:xfrm>
+            <a:off x="2944800" y="1105200"/>
+            <a:ext cx="1206000" cy="0"/>
+          </a:xfrm>
+          <a:prstGeom prst="line">
+            <a:avLst/>
+          </a:prstGeom>
+          <a:ln w="25400">
+            <a:solidFill>
+              <a:srgbClr val="000000"/>
+            </a:solidFill>
+          </a:ln>
+          <a:effectLst/>
+        </p:spPr>
+        <p:style>
+          <a:lnRef idx="2">
+            <a:schemeClr val="accent1"/>
+          </a:lnRef>
+          <a:fillRef idx="0">
+            <a:schemeClr val="accent1"/>
+          </a:fillRef>
+          <a:effectRef idx="1">
+            <a:schemeClr val="accent1"/>
+          </a:effectRef>
+          <a:fontRef idx="minor">
+            <a:schemeClr val="tx1"/>
+          </a:fontRef>
+        </p:style>
+      </p:cxnSp>
+      <p:cxnSp>
+        <p:nvCxnSpPr>
+          <p:cNvPr id="17" name="Connector 16"/>
+          <p:cNvCxnSpPr/>
+          <p:nvPr/>
+        </p:nvCxnSpPr>
+        <p:spPr>
+          <a:xfrm>
+            <a:off x="4230000" y="1105200"/>
+            <a:ext cx="3528000" cy="0"/>
+          </a:xfrm>
+          <a:prstGeom prst="line">
+            <a:avLst/>
+          </a:prstGeom>
+          <a:ln w="25400">
+            <a:solidFill>
+              <a:srgbClr val="000000"/>
+            </a:solidFill>
+          </a:ln>
+          <a:effectLst/>
+        </p:spPr>
+        <p:style>
+          <a:lnRef idx="2">
+            <a:schemeClr val="accent1"/>
+          </a:lnRef>
+          <a:fillRef idx="0">
+            <a:schemeClr val="accent1"/>
+          </a:fillRef>
+          <a:effectRef idx="1">
+            <a:schemeClr val="accent1"/>
+          </a:effectRef>
+          <a:fontRef idx="minor">
+            <a:schemeClr val="tx1"/>
+          </a:fontRef>
+        </p:style>
+      </p:cxnSp>
+      <p:cxnSp>
+        <p:nvCxnSpPr>
+          <p:cNvPr id="18" name="Connector 17"/>
+          <p:cNvCxnSpPr/>
+          <p:nvPr/>
+        </p:nvCxnSpPr>
+        <p:spPr>
+          <a:xfrm>
+            <a:off x="7920000" y="1105200"/>
+            <a:ext cx="3938400" cy="0"/>
+          </a:xfrm>
+          <a:prstGeom prst="line">
+            <a:avLst/>
+          </a:prstGeom>
+          <a:ln w="25400">
+            <a:solidFill>
+              <a:srgbClr val="000000"/>
+            </a:solidFill>
+          </a:ln>
+          <a:effectLst/>
+        </p:spPr>
+        <p:style>
+          <a:lnRef idx="2">
+            <a:schemeClr val="accent1"/>
+          </a:lnRef>
+          <a:fillRef idx="0">
+            <a:schemeClr val="accent1"/>
+          </a:fillRef>
+          <a:effectRef idx="1">
+            <a:schemeClr val="accent1"/>
+          </a:effectRef>
+          <a:fontRef idx="minor">
+            <a:schemeClr val="tx1"/>
+          </a:fontRef>
+        </p:style>
+      </p:cxnSp>
+      <p:sp>
+        <p:nvSpPr>
+          <p:cNvPr id="19" name="TextBox 18"/>
+          <p:cNvSpPr txBox="1"/>
+          <p:nvPr/>
+        </p:nvSpPr>
+        <p:spPr>
+          <a:xfrm>
             <a:off x="435600" y="1360800"/>
             <a:ext cx="1076400" cy="252000"/>
           </a:xfrm>
@@ -7233,6 +7893,7 @@
           </a:bodyPr>
           <a:lstStyle/>
           <a:p>
+            <a:pPr algn="ctr"/>
             <a:r>
               <a:rPr sz="1050" b="0" i="0">
                 <a:solidFill>
@@ -7247,7 +7908,7 @@
       </p:sp>
       <p:sp>
         <p:nvSpPr>
-          <p:cNvPr id="3" name="TextBox 2"/>
+          <p:cNvPr id="20" name="TextBox 19"/>
           <p:cNvSpPr txBox="1"/>
           <p:nvPr/>
         </p:nvSpPr>
@@ -7267,6 +7928,7 @@
           </a:bodyPr>
           <a:lstStyle/>
           <a:p>
+            <a:pPr algn="ctr"/>
             <a:r>
               <a:rPr sz="1050" b="0" i="0">
                 <a:solidFill>
@@ -7281,7 +7943,7 @@
       </p:sp>
       <p:sp>
         <p:nvSpPr>
-          <p:cNvPr id="4" name="TextBox 3"/>
+          <p:cNvPr id="21" name="TextBox 20"/>
           <p:cNvSpPr txBox="1"/>
           <p:nvPr/>
         </p:nvSpPr>
@@ -7301,6 +7963,7 @@
           </a:bodyPr>
           <a:lstStyle/>
           <a:p>
+            <a:pPr algn="ctr"/>
             <a:r>
               <a:rPr sz="1050" b="0" i="0">
                 <a:solidFill>
@@ -7315,7 +7978,7 @@
       </p:sp>
       <p:sp>
         <p:nvSpPr>
-          <p:cNvPr id="5" name="TextBox 4"/>
+          <p:cNvPr id="22" name="TextBox 21"/>
           <p:cNvSpPr txBox="1"/>
           <p:nvPr/>
         </p:nvSpPr>
@@ -7335,6 +7998,7 @@
           </a:bodyPr>
           <a:lstStyle/>
           <a:p>
+            <a:pPr algn="ctr"/>
             <a:r>
               <a:rPr sz="900" b="0" i="0">
                 <a:solidFill>
@@ -7350,7 +8014,7 @@
       </p:sp>
       <p:sp>
         <p:nvSpPr>
-          <p:cNvPr id="6" name="TextBox 5"/>
+          <p:cNvPr id="23" name="TextBox 22"/>
           <p:cNvSpPr txBox="1"/>
           <p:nvPr/>
         </p:nvSpPr>
@@ -7370,6 +8034,7 @@
           </a:bodyPr>
           <a:lstStyle/>
           <a:p>
+            <a:pPr algn="ctr"/>
             <a:r>
               <a:rPr sz="900" b="0" i="0">
                 <a:solidFill>
@@ -7385,7 +8050,7 @@
       </p:sp>
       <p:sp>
         <p:nvSpPr>
-          <p:cNvPr id="7" name="TextBox 6"/>
+          <p:cNvPr id="24" name="TextBox 23"/>
           <p:cNvSpPr txBox="1"/>
           <p:nvPr/>
         </p:nvSpPr>
@@ -7405,6 +8070,7 @@
           </a:bodyPr>
           <a:lstStyle/>
           <a:p>
+            <a:pPr algn="ctr"/>
             <a:r>
               <a:rPr sz="900" b="0" i="0">
                 <a:solidFill>
@@ -7420,7 +8086,7 @@
       </p:sp>
       <p:sp>
         <p:nvSpPr>
-          <p:cNvPr id="8" name="TextBox 7"/>
+          <p:cNvPr id="25" name="TextBox 24"/>
           <p:cNvSpPr txBox="1"/>
           <p:nvPr/>
         </p:nvSpPr>
@@ -7440,6 +8106,7 @@
           </a:bodyPr>
           <a:lstStyle/>
           <a:p>
+            <a:pPr algn="ctr"/>
             <a:r>
               <a:rPr sz="900" b="0" i="0">
                 <a:solidFill>
@@ -7455,7 +8122,7 @@
       </p:sp>
       <p:sp>
         <p:nvSpPr>
-          <p:cNvPr id="9" name="TextBox 8"/>
+          <p:cNvPr id="26" name="TextBox 25"/>
           <p:cNvSpPr txBox="1"/>
           <p:nvPr/>
         </p:nvSpPr>
@@ -7475,6 +8142,7 @@
           </a:bodyPr>
           <a:lstStyle/>
           <a:p>
+            <a:pPr algn="ctr"/>
             <a:r>
               <a:rPr sz="900" b="0" i="0">
                 <a:solidFill>
@@ -7490,7 +8158,7 @@
       </p:sp>
       <p:sp>
         <p:nvSpPr>
-          <p:cNvPr id="10" name="TextBox 9"/>
+          <p:cNvPr id="27" name="TextBox 26"/>
           <p:cNvSpPr txBox="1"/>
           <p:nvPr/>
         </p:nvSpPr>
@@ -7510,6 +8178,7 @@
           </a:bodyPr>
           <a:lstStyle/>
           <a:p>
+            <a:pPr algn="ctr"/>
             <a:r>
               <a:rPr sz="900" b="0" i="0">
                 <a:solidFill>
@@ -7525,7 +8194,7 @@
       </p:sp>
       <p:sp>
         <p:nvSpPr>
-          <p:cNvPr id="11" name="TextBox 10"/>
+          <p:cNvPr id="28" name="TextBox 27"/>
           <p:cNvSpPr txBox="1"/>
           <p:nvPr/>
         </p:nvSpPr>
@@ -7545,6 +8214,7 @@
           </a:bodyPr>
           <a:lstStyle/>
           <a:p>
+            <a:pPr algn="ctr"/>
             <a:r>
               <a:rPr sz="1050" b="0" i="0">
                 <a:solidFill>
@@ -7559,7 +8229,7 @@
       </p:sp>
       <p:sp>
         <p:nvSpPr>
-          <p:cNvPr id="12" name="TextBox 11"/>
+          <p:cNvPr id="29" name="TextBox 28"/>
           <p:cNvSpPr txBox="1"/>
           <p:nvPr/>
         </p:nvSpPr>
@@ -7579,6 +8249,7 @@
           </a:bodyPr>
           <a:lstStyle/>
           <a:p>
+            <a:pPr algn="ctr"/>
             <a:r>
               <a:rPr sz="1050" b="0" i="0">
                 <a:solidFill>
@@ -7593,7 +8264,7 @@
       </p:sp>
       <p:sp>
         <p:nvSpPr>
-          <p:cNvPr id="13" name="TextBox 12"/>
+          <p:cNvPr id="30" name="TextBox 29"/>
           <p:cNvSpPr txBox="1"/>
           <p:nvPr/>
         </p:nvSpPr>
@@ -7613,6 +8284,7 @@
           </a:bodyPr>
           <a:lstStyle/>
           <a:p>
+            <a:pPr algn="ctr"/>
             <a:r>
               <a:rPr sz="1050" b="0" i="0">
                 <a:solidFill>
@@ -7627,7 +8299,7 @@
       </p:sp>
       <p:sp>
         <p:nvSpPr>
-          <p:cNvPr id="14" name="TextBox 13"/>
+          <p:cNvPr id="31" name="TextBox 30"/>
           <p:cNvSpPr txBox="1"/>
           <p:nvPr/>
         </p:nvSpPr>
@@ -7647,6 +8319,7 @@
           </a:bodyPr>
           <a:lstStyle/>
           <a:p>
+            <a:pPr algn="ctr"/>
             <a:r>
               <a:rPr sz="900" b="0" i="0">
                 <a:solidFill>
@@ -7662,7 +8335,7 @@
       </p:sp>
       <p:sp>
         <p:nvSpPr>
-          <p:cNvPr id="15" name="TextBox 14"/>
+          <p:cNvPr id="32" name="TextBox 31"/>
           <p:cNvSpPr txBox="1"/>
           <p:nvPr/>
         </p:nvSpPr>
@@ -7682,6 +8355,7 @@
           </a:bodyPr>
           <a:lstStyle/>
           <a:p>
+            <a:pPr algn="ctr"/>
             <a:r>
               <a:rPr sz="900" b="0" i="0">
                 <a:solidFill>
@@ -7697,7 +8371,7 @@
       </p:sp>
       <p:sp>
         <p:nvSpPr>
-          <p:cNvPr id="16" name="TextBox 15"/>
+          <p:cNvPr id="33" name="TextBox 32"/>
           <p:cNvSpPr txBox="1"/>
           <p:nvPr/>
         </p:nvSpPr>
@@ -7717,6 +8391,7 @@
           </a:bodyPr>
           <a:lstStyle/>
           <a:p>
+            <a:pPr algn="ctr"/>
             <a:r>
               <a:rPr sz="900" b="0" i="0">
                 <a:solidFill>
@@ -7732,7 +8407,7 @@
       </p:sp>
       <p:sp>
         <p:nvSpPr>
-          <p:cNvPr id="17" name="TextBox 16"/>
+          <p:cNvPr id="34" name="TextBox 33"/>
           <p:cNvSpPr txBox="1"/>
           <p:nvPr/>
         </p:nvSpPr>
@@ -7752,6 +8427,7 @@
           </a:bodyPr>
           <a:lstStyle/>
           <a:p>
+            <a:pPr algn="ctr"/>
             <a:r>
               <a:rPr sz="900" b="0" i="0">
                 <a:solidFill>
@@ -7767,7 +8443,7 @@
       </p:sp>
       <p:sp>
         <p:nvSpPr>
-          <p:cNvPr id="18" name="TextBox 17"/>
+          <p:cNvPr id="35" name="TextBox 34"/>
           <p:cNvSpPr txBox="1"/>
           <p:nvPr/>
         </p:nvSpPr>
@@ -7787,6 +8463,7 @@
           </a:bodyPr>
           <a:lstStyle/>
           <a:p>
+            <a:pPr algn="ctr"/>
             <a:r>
               <a:rPr sz="900" b="0" i="0">
                 <a:solidFill>
@@ -7802,7 +8479,7 @@
       </p:sp>
       <p:sp>
         <p:nvSpPr>
-          <p:cNvPr id="19" name="TextBox 18"/>
+          <p:cNvPr id="36" name="TextBox 35"/>
           <p:cNvSpPr txBox="1"/>
           <p:nvPr/>
         </p:nvSpPr>
@@ -7822,6 +8499,7 @@
           </a:bodyPr>
           <a:lstStyle/>
           <a:p>
+            <a:pPr algn="ctr"/>
             <a:r>
               <a:rPr sz="900" b="0" i="0">
                 <a:solidFill>
@@ -7837,7 +8515,7 @@
       </p:sp>
       <p:sp>
         <p:nvSpPr>
-          <p:cNvPr id="20" name="TextBox 19"/>
+          <p:cNvPr id="37" name="TextBox 36"/>
           <p:cNvSpPr txBox="1"/>
           <p:nvPr/>
         </p:nvSpPr>
@@ -7857,6 +8535,7 @@
           </a:bodyPr>
           <a:lstStyle/>
           <a:p>
+            <a:pPr algn="ctr"/>
             <a:r>
               <a:rPr sz="1050" b="0" i="0">
                 <a:solidFill>
@@ -7871,7 +8550,7 @@
       </p:sp>
       <p:sp>
         <p:nvSpPr>
-          <p:cNvPr id="21" name="TextBox 20"/>
+          <p:cNvPr id="38" name="TextBox 37"/>
           <p:cNvSpPr txBox="1"/>
           <p:nvPr/>
         </p:nvSpPr>
@@ -7891,6 +8570,7 @@
           </a:bodyPr>
           <a:lstStyle/>
           <a:p>
+            <a:pPr algn="ctr"/>
             <a:r>
               <a:rPr sz="1050" b="0" i="0">
                 <a:solidFill>
@@ -7905,7 +8585,7 @@
       </p:sp>
       <p:sp>
         <p:nvSpPr>
-          <p:cNvPr id="22" name="TextBox 21"/>
+          <p:cNvPr id="39" name="TextBox 38"/>
           <p:cNvSpPr txBox="1"/>
           <p:nvPr/>
         </p:nvSpPr>
@@ -7925,6 +8605,7 @@
           </a:bodyPr>
           <a:lstStyle/>
           <a:p>
+            <a:pPr algn="ctr"/>
             <a:r>
               <a:rPr sz="1050" b="0" i="0">
                 <a:solidFill>
@@ -7939,7 +8620,7 @@
       </p:sp>
       <p:sp>
         <p:nvSpPr>
-          <p:cNvPr id="23" name="TextBox 22"/>
+          <p:cNvPr id="40" name="TextBox 39"/>
           <p:cNvSpPr txBox="1"/>
           <p:nvPr/>
         </p:nvSpPr>
@@ -7959,6 +8640,7 @@
           </a:bodyPr>
           <a:lstStyle/>
           <a:p>
+            <a:pPr algn="ctr"/>
             <a:r>
               <a:rPr sz="900" b="0" i="0">
                 <a:solidFill>
@@ -7974,7 +8656,7 @@
       </p:sp>
       <p:sp>
         <p:nvSpPr>
-          <p:cNvPr id="24" name="TextBox 23"/>
+          <p:cNvPr id="41" name="TextBox 40"/>
           <p:cNvSpPr txBox="1"/>
           <p:nvPr/>
         </p:nvSpPr>
@@ -7994,6 +8676,7 @@
           </a:bodyPr>
           <a:lstStyle/>
           <a:p>
+            <a:pPr algn="ctr"/>
             <a:r>
               <a:rPr sz="900" b="0" i="0">
                 <a:solidFill>
@@ -8009,7 +8692,7 @@
       </p:sp>
       <p:sp>
         <p:nvSpPr>
-          <p:cNvPr id="25" name="TextBox 24"/>
+          <p:cNvPr id="42" name="TextBox 41"/>
           <p:cNvSpPr txBox="1"/>
           <p:nvPr/>
         </p:nvSpPr>
@@ -8029,6 +8712,7 @@
           </a:bodyPr>
           <a:lstStyle/>
           <a:p>
+            <a:pPr algn="ctr"/>
             <a:r>
               <a:rPr sz="900" b="0" i="0">
                 <a:solidFill>
@@ -8044,7 +8728,7 @@
       </p:sp>
       <p:sp>
         <p:nvSpPr>
-          <p:cNvPr id="26" name="TextBox 25"/>
+          <p:cNvPr id="43" name="TextBox 42"/>
           <p:cNvSpPr txBox="1"/>
           <p:nvPr/>
         </p:nvSpPr>
@@ -8064,6 +8748,7 @@
           </a:bodyPr>
           <a:lstStyle/>
           <a:p>
+            <a:pPr algn="ctr"/>
             <a:r>
               <a:rPr sz="900" b="0" i="0">
                 <a:solidFill>
@@ -8079,7 +8764,7 @@
       </p:sp>
       <p:sp>
         <p:nvSpPr>
-          <p:cNvPr id="27" name="TextBox 26"/>
+          <p:cNvPr id="44" name="TextBox 43"/>
           <p:cNvSpPr txBox="1"/>
           <p:nvPr/>
         </p:nvSpPr>
@@ -8099,6 +8784,7 @@
           </a:bodyPr>
           <a:lstStyle/>
           <a:p>
+            <a:pPr algn="ctr"/>
             <a:r>
               <a:rPr sz="900" b="0" i="0">
                 <a:solidFill>
@@ -8114,7 +8800,7 @@
       </p:sp>
       <p:sp>
         <p:nvSpPr>
-          <p:cNvPr id="28" name="TextBox 27"/>
+          <p:cNvPr id="45" name="TextBox 44"/>
           <p:cNvSpPr txBox="1"/>
           <p:nvPr/>
         </p:nvSpPr>
@@ -8134,6 +8820,7 @@
           </a:bodyPr>
           <a:lstStyle/>
           <a:p>
+            <a:pPr algn="ctr"/>
             <a:r>
               <a:rPr sz="900" b="0" i="0">
                 <a:solidFill>
@@ -8149,7 +8836,7 @@
       </p:sp>
       <p:sp>
         <p:nvSpPr>
-          <p:cNvPr id="29" name="TextBox 28"/>
+          <p:cNvPr id="46" name="TextBox 45"/>
           <p:cNvSpPr txBox="1"/>
           <p:nvPr/>
         </p:nvSpPr>
@@ -8169,6 +8856,7 @@
           </a:bodyPr>
           <a:lstStyle/>
           <a:p>
+            <a:pPr algn="ctr"/>
             <a:r>
               <a:rPr sz="1050" b="0" i="0">
                 <a:solidFill>
@@ -8183,7 +8871,7 @@
       </p:sp>
       <p:sp>
         <p:nvSpPr>
-          <p:cNvPr id="30" name="TextBox 29"/>
+          <p:cNvPr id="47" name="TextBox 46"/>
           <p:cNvSpPr txBox="1"/>
           <p:nvPr/>
         </p:nvSpPr>
@@ -8203,6 +8891,7 @@
           </a:bodyPr>
           <a:lstStyle/>
           <a:p>
+            <a:pPr algn="ctr"/>
             <a:r>
               <a:rPr sz="1050" b="0" i="0">
                 <a:solidFill>
@@ -8217,7 +8906,7 @@
       </p:sp>
       <p:sp>
         <p:nvSpPr>
-          <p:cNvPr id="31" name="TextBox 30"/>
+          <p:cNvPr id="48" name="TextBox 47"/>
           <p:cNvSpPr txBox="1"/>
           <p:nvPr/>
         </p:nvSpPr>
@@ -8237,6 +8926,7 @@
           </a:bodyPr>
           <a:lstStyle/>
           <a:p>
+            <a:pPr algn="ctr"/>
             <a:r>
               <a:rPr sz="1050" b="0" i="0">
                 <a:solidFill>
@@ -8251,7 +8941,7 @@
       </p:sp>
       <p:sp>
         <p:nvSpPr>
-          <p:cNvPr id="32" name="TextBox 31"/>
+          <p:cNvPr id="49" name="TextBox 48"/>
           <p:cNvSpPr txBox="1"/>
           <p:nvPr/>
         </p:nvSpPr>
@@ -8271,6 +8961,7 @@
           </a:bodyPr>
           <a:lstStyle/>
           <a:p>
+            <a:pPr algn="ctr"/>
             <a:r>
               <a:rPr sz="900" b="0" i="0">
                 <a:solidFill>
@@ -8286,7 +8977,7 @@
       </p:sp>
       <p:sp>
         <p:nvSpPr>
-          <p:cNvPr id="33" name="TextBox 32"/>
+          <p:cNvPr id="50" name="TextBox 49"/>
           <p:cNvSpPr txBox="1"/>
           <p:nvPr/>
         </p:nvSpPr>
@@ -8306,6 +8997,7 @@
           </a:bodyPr>
           <a:lstStyle/>
           <a:p>
+            <a:pPr algn="ctr"/>
             <a:r>
               <a:rPr sz="900" b="0" i="0">
                 <a:solidFill>
@@ -8321,7 +9013,7 @@
       </p:sp>
       <p:sp>
         <p:nvSpPr>
-          <p:cNvPr id="34" name="TextBox 33"/>
+          <p:cNvPr id="51" name="TextBox 50"/>
           <p:cNvSpPr txBox="1"/>
           <p:nvPr/>
         </p:nvSpPr>
@@ -8341,6 +9033,7 @@
           </a:bodyPr>
           <a:lstStyle/>
           <a:p>
+            <a:pPr algn="ctr"/>
             <a:r>
               <a:rPr sz="900" b="0" i="0">
                 <a:solidFill>
@@ -8356,7 +9049,7 @@
       </p:sp>
       <p:sp>
         <p:nvSpPr>
-          <p:cNvPr id="35" name="TextBox 34"/>
+          <p:cNvPr id="52" name="TextBox 51"/>
           <p:cNvSpPr txBox="1"/>
           <p:nvPr/>
         </p:nvSpPr>
@@ -8376,6 +9069,7 @@
           </a:bodyPr>
           <a:lstStyle/>
           <a:p>
+            <a:pPr algn="ctr"/>
             <a:r>
               <a:rPr sz="900" b="0" i="0">
                 <a:solidFill>
@@ -8391,7 +9085,7 @@
       </p:sp>
       <p:sp>
         <p:nvSpPr>
-          <p:cNvPr id="36" name="TextBox 35"/>
+          <p:cNvPr id="53" name="TextBox 52"/>
           <p:cNvSpPr txBox="1"/>
           <p:nvPr/>
         </p:nvSpPr>
@@ -8411,6 +9105,7 @@
           </a:bodyPr>
           <a:lstStyle/>
           <a:p>
+            <a:pPr algn="ctr"/>
             <a:r>
               <a:rPr sz="900" b="0" i="0">
                 <a:solidFill>
@@ -8426,7 +9121,7 @@
       </p:sp>
       <p:sp>
         <p:nvSpPr>
-          <p:cNvPr id="37" name="TextBox 36"/>
+          <p:cNvPr id="54" name="TextBox 53"/>
           <p:cNvSpPr txBox="1"/>
           <p:nvPr/>
         </p:nvSpPr>
@@ -8446,6 +9141,7 @@
           </a:bodyPr>
           <a:lstStyle/>
           <a:p>
+            <a:pPr algn="ctr"/>
             <a:r>
               <a:rPr sz="900" b="0" i="0">
                 <a:solidFill>
@@ -8461,7 +9157,7 @@
       </p:sp>
       <p:sp>
         <p:nvSpPr>
-          <p:cNvPr id="38" name="TextBox 37"/>
+          <p:cNvPr id="55" name="TextBox 54"/>
           <p:cNvSpPr txBox="1"/>
           <p:nvPr/>
         </p:nvSpPr>
@@ -8481,6 +9177,7 @@
           </a:bodyPr>
           <a:lstStyle/>
           <a:p>
+            <a:pPr algn="ctr"/>
             <a:r>
               <a:rPr sz="1050" b="0" i="0">
                 <a:solidFill>
@@ -8495,7 +9192,7 @@
       </p:sp>
       <p:sp>
         <p:nvSpPr>
-          <p:cNvPr id="39" name="TextBox 38"/>
+          <p:cNvPr id="56" name="TextBox 55"/>
           <p:cNvSpPr txBox="1"/>
           <p:nvPr/>
         </p:nvSpPr>
@@ -8515,6 +9212,7 @@
           </a:bodyPr>
           <a:lstStyle/>
           <a:p>
+            <a:pPr algn="ctr"/>
             <a:r>
               <a:rPr sz="1050" b="0" i="0">
                 <a:solidFill>
@@ -8529,7 +9227,7 @@
       </p:sp>
       <p:sp>
         <p:nvSpPr>
-          <p:cNvPr id="40" name="TextBox 39"/>
+          <p:cNvPr id="57" name="TextBox 56"/>
           <p:cNvSpPr txBox="1"/>
           <p:nvPr/>
         </p:nvSpPr>
@@ -8549,6 +9247,7 @@
           </a:bodyPr>
           <a:lstStyle/>
           <a:p>
+            <a:pPr algn="ctr"/>
             <a:r>
               <a:rPr sz="1050" b="0" i="0">
                 <a:solidFill>
@@ -8563,7 +9262,7 @@
       </p:sp>
       <p:sp>
         <p:nvSpPr>
-          <p:cNvPr id="41" name="TextBox 40"/>
+          <p:cNvPr id="58" name="TextBox 57"/>
           <p:cNvSpPr txBox="1"/>
           <p:nvPr/>
         </p:nvSpPr>
@@ -8583,6 +9282,7 @@
           </a:bodyPr>
           <a:lstStyle/>
           <a:p>
+            <a:pPr algn="ctr"/>
             <a:r>
               <a:rPr sz="900" b="0" i="0">
                 <a:solidFill>
@@ -8598,7 +9298,7 @@
       </p:sp>
       <p:sp>
         <p:nvSpPr>
-          <p:cNvPr id="42" name="TextBox 41"/>
+          <p:cNvPr id="59" name="TextBox 58"/>
           <p:cNvSpPr txBox="1"/>
           <p:nvPr/>
         </p:nvSpPr>
@@ -8618,6 +9318,7 @@
           </a:bodyPr>
           <a:lstStyle/>
           <a:p>
+            <a:pPr algn="ctr"/>
             <a:r>
               <a:rPr sz="900" b="0" i="0">
                 <a:solidFill>
@@ -8633,7 +9334,7 @@
       </p:sp>
       <p:sp>
         <p:nvSpPr>
-          <p:cNvPr id="43" name="TextBox 42"/>
+          <p:cNvPr id="60" name="TextBox 59"/>
           <p:cNvSpPr txBox="1"/>
           <p:nvPr/>
         </p:nvSpPr>
@@ -8653,6 +9354,7 @@
           </a:bodyPr>
           <a:lstStyle/>
           <a:p>
+            <a:pPr algn="ctr"/>
             <a:r>
               <a:rPr sz="900" b="0" i="0">
                 <a:solidFill>
@@ -8668,7 +9370,7 @@
       </p:sp>
       <p:sp>
         <p:nvSpPr>
-          <p:cNvPr id="44" name="TextBox 43"/>
+          <p:cNvPr id="61" name="TextBox 60"/>
           <p:cNvSpPr txBox="1"/>
           <p:nvPr/>
         </p:nvSpPr>
@@ -8688,6 +9390,7 @@
           </a:bodyPr>
           <a:lstStyle/>
           <a:p>
+            <a:pPr algn="ctr"/>
             <a:r>
               <a:rPr sz="900" b="0" i="0">
                 <a:solidFill>
@@ -8703,7 +9406,7 @@
       </p:sp>
       <p:sp>
         <p:nvSpPr>
-          <p:cNvPr id="45" name="TextBox 44"/>
+          <p:cNvPr id="62" name="TextBox 61"/>
           <p:cNvSpPr txBox="1"/>
           <p:nvPr/>
         </p:nvSpPr>
@@ -8723,6 +9426,7 @@
           </a:bodyPr>
           <a:lstStyle/>
           <a:p>
+            <a:pPr algn="ctr"/>
             <a:r>
               <a:rPr sz="900" b="0" i="0">
                 <a:solidFill>
@@ -8738,7 +9442,7 @@
       </p:sp>
       <p:sp>
         <p:nvSpPr>
-          <p:cNvPr id="46" name="TextBox 45"/>
+          <p:cNvPr id="63" name="TextBox 62"/>
           <p:cNvSpPr txBox="1"/>
           <p:nvPr/>
         </p:nvSpPr>
@@ -8758,6 +9462,7 @@
           </a:bodyPr>
           <a:lstStyle/>
           <a:p>
+            <a:pPr algn="ctr"/>
             <a:r>
               <a:rPr sz="900" b="0" i="0">
                 <a:solidFill>
@@ -8773,7 +9478,7 @@
       </p:sp>
       <p:sp>
         <p:nvSpPr>
-          <p:cNvPr id="47" name="TextBox 46"/>
+          <p:cNvPr id="64" name="TextBox 63"/>
           <p:cNvSpPr txBox="1"/>
           <p:nvPr/>
         </p:nvSpPr>
@@ -8793,6 +9498,7 @@
           </a:bodyPr>
           <a:lstStyle/>
           <a:p>
+            <a:pPr algn="ctr"/>
             <a:r>
               <a:rPr sz="1050" b="0" i="0">
                 <a:solidFill>
@@ -8807,7 +9513,7 @@
       </p:sp>
       <p:sp>
         <p:nvSpPr>
-          <p:cNvPr id="48" name="TextBox 47"/>
+          <p:cNvPr id="65" name="TextBox 64"/>
           <p:cNvSpPr txBox="1"/>
           <p:nvPr/>
         </p:nvSpPr>
@@ -8827,6 +9533,7 @@
           </a:bodyPr>
           <a:lstStyle/>
           <a:p>
+            <a:pPr algn="ctr"/>
             <a:r>
               <a:rPr sz="1050" b="0" i="0">
                 <a:solidFill>
@@ -8841,7 +9548,7 @@
       </p:sp>
       <p:sp>
         <p:nvSpPr>
-          <p:cNvPr id="49" name="TextBox 48"/>
+          <p:cNvPr id="66" name="TextBox 65"/>
           <p:cNvSpPr txBox="1"/>
           <p:nvPr/>
         </p:nvSpPr>
@@ -8861,6 +9568,7 @@
           </a:bodyPr>
           <a:lstStyle/>
           <a:p>
+            <a:pPr algn="ctr"/>
             <a:r>
               <a:rPr sz="1050" b="0" i="0">
                 <a:solidFill>
@@ -8875,7 +9583,7 @@
       </p:sp>
       <p:sp>
         <p:nvSpPr>
-          <p:cNvPr id="50" name="TextBox 49"/>
+          <p:cNvPr id="67" name="TextBox 66"/>
           <p:cNvSpPr txBox="1"/>
           <p:nvPr/>
         </p:nvSpPr>
@@ -8895,6 +9603,7 @@
           </a:bodyPr>
           <a:lstStyle/>
           <a:p>
+            <a:pPr algn="ctr"/>
             <a:r>
               <a:rPr sz="900" b="0" i="0">
                 <a:solidFill>
@@ -8910,7 +9619,7 @@
       </p:sp>
       <p:sp>
         <p:nvSpPr>
-          <p:cNvPr id="51" name="TextBox 50"/>
+          <p:cNvPr id="68" name="TextBox 67"/>
           <p:cNvSpPr txBox="1"/>
           <p:nvPr/>
         </p:nvSpPr>
@@ -8930,6 +9639,7 @@
           </a:bodyPr>
           <a:lstStyle/>
           <a:p>
+            <a:pPr algn="ctr"/>
             <a:r>
               <a:rPr sz="900" b="0" i="0">
                 <a:solidFill>
@@ -8945,7 +9655,7 @@
       </p:sp>
       <p:sp>
         <p:nvSpPr>
-          <p:cNvPr id="52" name="TextBox 51"/>
+          <p:cNvPr id="69" name="TextBox 68"/>
           <p:cNvSpPr txBox="1"/>
           <p:nvPr/>
         </p:nvSpPr>
@@ -8965,6 +9675,7 @@
           </a:bodyPr>
           <a:lstStyle/>
           <a:p>
+            <a:pPr algn="ctr"/>
             <a:r>
               <a:rPr sz="900" b="0" i="0">
                 <a:solidFill>
@@ -8980,7 +9691,7 @@
       </p:sp>
       <p:sp>
         <p:nvSpPr>
-          <p:cNvPr id="53" name="TextBox 52"/>
+          <p:cNvPr id="70" name="TextBox 69"/>
           <p:cNvSpPr txBox="1"/>
           <p:nvPr/>
         </p:nvSpPr>
@@ -9000,6 +9711,7 @@
           </a:bodyPr>
           <a:lstStyle/>
           <a:p>
+            <a:pPr algn="ctr"/>
             <a:r>
               <a:rPr sz="900" b="0" i="0">
                 <a:solidFill>
@@ -9015,7 +9727,7 @@
       </p:sp>
       <p:sp>
         <p:nvSpPr>
-          <p:cNvPr id="54" name="TextBox 53"/>
+          <p:cNvPr id="71" name="TextBox 70"/>
           <p:cNvSpPr txBox="1"/>
           <p:nvPr/>
         </p:nvSpPr>
@@ -9035,6 +9747,7 @@
           </a:bodyPr>
           <a:lstStyle/>
           <a:p>
+            <a:pPr algn="ctr"/>
             <a:r>
               <a:rPr sz="900" b="0" i="0">
                 <a:solidFill>
@@ -9050,7 +9763,7 @@
       </p:sp>
       <p:sp>
         <p:nvSpPr>
-          <p:cNvPr id="55" name="TextBox 54"/>
+          <p:cNvPr id="72" name="TextBox 71"/>
           <p:cNvSpPr txBox="1"/>
           <p:nvPr/>
         </p:nvSpPr>
@@ -9070,6 +9783,7 @@
           </a:bodyPr>
           <a:lstStyle/>
           <a:p>
+            <a:pPr algn="ctr"/>
             <a:r>
               <a:rPr sz="900" b="0" i="0">
                 <a:solidFill>
@@ -9109,6 +9823,612 @@
         </p:nvSpPr>
         <p:spPr>
           <a:xfrm>
+            <a:off x="388800" y="813600"/>
+            <a:ext cx="1119600" cy="302400"/>
+          </a:xfrm>
+          <a:prstGeom prst="rect">
+            <a:avLst/>
+          </a:prstGeom>
+          <a:noFill/>
+        </p:spPr>
+        <p:txBody>
+          <a:bodyPr wrap="square">
+            <a:noAutofit/>
+          </a:bodyPr>
+          <a:lstStyle/>
+          <a:p>
+            <a:pPr algn="ctr"/>
+            <a:r>
+              <a:rPr sz="1400" b="1" i="0">
+                <a:solidFill>
+                  <a:srgbClr val="000000"/>
+                </a:solidFill>
+                <a:latin typeface="Calibri"/>
+              </a:rPr>
+              <a:t>Società</a:t>
+            </a:r>
+          </a:p>
+        </p:txBody>
+      </p:sp>
+      <p:sp>
+        <p:nvSpPr>
+          <p:cNvPr id="3" name="TextBox 2"/>
+          <p:cNvSpPr txBox="1"/>
+          <p:nvPr/>
+        </p:nvSpPr>
+        <p:spPr>
+          <a:xfrm>
+            <a:off x="1688400" y="813600"/>
+            <a:ext cx="1119600" cy="302400"/>
+          </a:xfrm>
+          <a:prstGeom prst="rect">
+            <a:avLst/>
+          </a:prstGeom>
+          <a:noFill/>
+        </p:spPr>
+        <p:txBody>
+          <a:bodyPr wrap="square">
+            <a:noAutofit/>
+          </a:bodyPr>
+          <a:lstStyle/>
+          <a:p>
+            <a:pPr algn="ctr"/>
+            <a:r>
+              <a:rPr sz="1400" b="1" i="0">
+                <a:solidFill>
+                  <a:srgbClr val="000000"/>
+                </a:solidFill>
+                <a:latin typeface="Calibri"/>
+              </a:rPr>
+              <a:t>Logo</a:t>
+            </a:r>
+          </a:p>
+        </p:txBody>
+      </p:sp>
+      <p:sp>
+        <p:nvSpPr>
+          <p:cNvPr id="4" name="TextBox 3"/>
+          <p:cNvSpPr txBox="1"/>
+          <p:nvPr/>
+        </p:nvSpPr>
+        <p:spPr>
+          <a:xfrm>
+            <a:off x="2984400" y="813600"/>
+            <a:ext cx="1119600" cy="302400"/>
+          </a:xfrm>
+          <a:prstGeom prst="rect">
+            <a:avLst/>
+          </a:prstGeom>
+          <a:noFill/>
+        </p:spPr>
+        <p:txBody>
+          <a:bodyPr wrap="square">
+            <a:noAutofit/>
+          </a:bodyPr>
+          <a:lstStyle/>
+          <a:p>
+            <a:pPr algn="ctr"/>
+            <a:r>
+              <a:rPr sz="1400" b="1" i="0">
+                <a:solidFill>
+                  <a:srgbClr val="000000"/>
+                </a:solidFill>
+                <a:latin typeface="Calibri"/>
+              </a:rPr>
+              <a:t>Sede</a:t>
+            </a:r>
+          </a:p>
+        </p:txBody>
+      </p:sp>
+      <p:sp>
+        <p:nvSpPr>
+          <p:cNvPr id="5" name="TextBox 4"/>
+          <p:cNvSpPr txBox="1"/>
+          <p:nvPr/>
+        </p:nvSpPr>
+        <p:spPr>
+          <a:xfrm>
+            <a:off x="4719600" y="813600"/>
+            <a:ext cx="2548800" cy="302400"/>
+          </a:xfrm>
+          <a:prstGeom prst="rect">
+            <a:avLst/>
+          </a:prstGeom>
+          <a:noFill/>
+        </p:spPr>
+        <p:txBody>
+          <a:bodyPr wrap="square">
+            <a:noAutofit/>
+          </a:bodyPr>
+          <a:lstStyle/>
+          <a:p>
+            <a:pPr algn="ctr"/>
+            <a:r>
+              <a:rPr sz="1400" b="1" i="0">
+                <a:solidFill>
+                  <a:srgbClr val="000000"/>
+                </a:solidFill>
+                <a:latin typeface="Calibri"/>
+              </a:rPr>
+              <a:t>Descrizione dell'attività svolta</a:t>
+            </a:r>
+          </a:p>
+        </p:txBody>
+      </p:sp>
+      <p:sp>
+        <p:nvSpPr>
+          <p:cNvPr id="6" name="TextBox 5"/>
+          <p:cNvSpPr txBox="1"/>
+          <p:nvPr/>
+        </p:nvSpPr>
+        <p:spPr>
+          <a:xfrm>
+            <a:off x="8766000" y="813600"/>
+            <a:ext cx="2185200" cy="302400"/>
+          </a:xfrm>
+          <a:prstGeom prst="rect">
+            <a:avLst/>
+          </a:prstGeom>
+          <a:noFill/>
+        </p:spPr>
+        <p:txBody>
+          <a:bodyPr wrap="square">
+            <a:noAutofit/>
+          </a:bodyPr>
+          <a:lstStyle/>
+          <a:p>
+            <a:pPr algn="ctr"/>
+            <a:r>
+              <a:rPr sz="1400" b="1" i="0">
+                <a:solidFill>
+                  <a:srgbClr val="000000"/>
+                </a:solidFill>
+                <a:latin typeface="Calibri"/>
+              </a:rPr>
+              <a:t>Key Financials (€/k)</a:t>
+            </a:r>
+          </a:p>
+        </p:txBody>
+      </p:sp>
+      <p:sp>
+        <p:nvSpPr>
+          <p:cNvPr id="7" name="TextBox 6"/>
+          <p:cNvSpPr txBox="1"/>
+          <p:nvPr/>
+        </p:nvSpPr>
+        <p:spPr>
+          <a:xfrm>
+            <a:off x="342000" y="198000"/>
+            <a:ext cx="10656000" cy="363600"/>
+          </a:xfrm>
+          <a:prstGeom prst="rect">
+            <a:avLst/>
+          </a:prstGeom>
+          <a:noFill/>
+        </p:spPr>
+        <p:txBody>
+          <a:bodyPr wrap="square">
+            <a:noAutofit/>
+          </a:bodyPr>
+          <a:lstStyle/>
+          <a:p>
+            <a:pPr algn="l"/>
+            <a:r>
+              <a:rPr sz="2400" b="0" i="0">
+                <a:solidFill>
+                  <a:srgbClr val="000000"/>
+                </a:solidFill>
+                <a:latin typeface="Calibri"/>
+              </a:rPr>
+              <a:t>Competitors Analysis</a:t>
+            </a:r>
+          </a:p>
+        </p:txBody>
+      </p:sp>
+      <p:cxnSp>
+        <p:nvCxnSpPr>
+          <p:cNvPr id="8" name="Connector 7"/>
+          <p:cNvCxnSpPr/>
+          <p:nvPr/>
+        </p:nvCxnSpPr>
+        <p:spPr>
+          <a:xfrm>
+            <a:off x="435600" y="1893600"/>
+            <a:ext cx="11325600" cy="0"/>
+          </a:xfrm>
+          <a:prstGeom prst="line">
+            <a:avLst/>
+          </a:prstGeom>
+          <a:ln w="12700">
+            <a:solidFill>
+              <a:srgbClr val="969696"/>
+            </a:solidFill>
+          </a:ln>
+          <a:effectLst/>
+        </p:spPr>
+        <p:style>
+          <a:lnRef idx="2">
+            <a:schemeClr val="accent1"/>
+          </a:lnRef>
+          <a:fillRef idx="0">
+            <a:schemeClr val="accent1"/>
+          </a:fillRef>
+          <a:effectRef idx="1">
+            <a:schemeClr val="accent1"/>
+          </a:effectRef>
+          <a:fontRef idx="minor">
+            <a:schemeClr val="tx1"/>
+          </a:fontRef>
+        </p:style>
+      </p:cxnSp>
+      <p:cxnSp>
+        <p:nvCxnSpPr>
+          <p:cNvPr id="9" name="Connector 8"/>
+          <p:cNvCxnSpPr/>
+          <p:nvPr/>
+        </p:nvCxnSpPr>
+        <p:spPr>
+          <a:xfrm>
+            <a:off x="435600" y="2653200"/>
+            <a:ext cx="11325600" cy="0"/>
+          </a:xfrm>
+          <a:prstGeom prst="line">
+            <a:avLst/>
+          </a:prstGeom>
+          <a:ln w="12700">
+            <a:solidFill>
+              <a:srgbClr val="969696"/>
+            </a:solidFill>
+          </a:ln>
+          <a:effectLst/>
+        </p:spPr>
+        <p:style>
+          <a:lnRef idx="2">
+            <a:schemeClr val="accent1"/>
+          </a:lnRef>
+          <a:fillRef idx="0">
+            <a:schemeClr val="accent1"/>
+          </a:fillRef>
+          <a:effectRef idx="1">
+            <a:schemeClr val="accent1"/>
+          </a:effectRef>
+          <a:fontRef idx="minor">
+            <a:schemeClr val="tx1"/>
+          </a:fontRef>
+        </p:style>
+      </p:cxnSp>
+      <p:cxnSp>
+        <p:nvCxnSpPr>
+          <p:cNvPr id="10" name="Connector 9"/>
+          <p:cNvCxnSpPr/>
+          <p:nvPr/>
+        </p:nvCxnSpPr>
+        <p:spPr>
+          <a:xfrm>
+            <a:off x="435600" y="3412800"/>
+            <a:ext cx="11325600" cy="0"/>
+          </a:xfrm>
+          <a:prstGeom prst="line">
+            <a:avLst/>
+          </a:prstGeom>
+          <a:ln w="12700">
+            <a:solidFill>
+              <a:srgbClr val="969696"/>
+            </a:solidFill>
+          </a:ln>
+          <a:effectLst/>
+        </p:spPr>
+        <p:style>
+          <a:lnRef idx="2">
+            <a:schemeClr val="accent1"/>
+          </a:lnRef>
+          <a:fillRef idx="0">
+            <a:schemeClr val="accent1"/>
+          </a:fillRef>
+          <a:effectRef idx="1">
+            <a:schemeClr val="accent1"/>
+          </a:effectRef>
+          <a:fontRef idx="minor">
+            <a:schemeClr val="tx1"/>
+          </a:fontRef>
+        </p:style>
+      </p:cxnSp>
+      <p:cxnSp>
+        <p:nvCxnSpPr>
+          <p:cNvPr id="11" name="Connector 10"/>
+          <p:cNvCxnSpPr/>
+          <p:nvPr/>
+        </p:nvCxnSpPr>
+        <p:spPr>
+          <a:xfrm>
+            <a:off x="435600" y="4183200"/>
+            <a:ext cx="11325600" cy="0"/>
+          </a:xfrm>
+          <a:prstGeom prst="line">
+            <a:avLst/>
+          </a:prstGeom>
+          <a:ln w="12700">
+            <a:solidFill>
+              <a:srgbClr val="969696"/>
+            </a:solidFill>
+          </a:ln>
+          <a:effectLst/>
+        </p:spPr>
+        <p:style>
+          <a:lnRef idx="2">
+            <a:schemeClr val="accent1"/>
+          </a:lnRef>
+          <a:fillRef idx="0">
+            <a:schemeClr val="accent1"/>
+          </a:fillRef>
+          <a:effectRef idx="1">
+            <a:schemeClr val="accent1"/>
+          </a:effectRef>
+          <a:fontRef idx="minor">
+            <a:schemeClr val="tx1"/>
+          </a:fontRef>
+        </p:style>
+      </p:cxnSp>
+      <p:cxnSp>
+        <p:nvCxnSpPr>
+          <p:cNvPr id="12" name="Connector 11"/>
+          <p:cNvCxnSpPr/>
+          <p:nvPr/>
+        </p:nvCxnSpPr>
+        <p:spPr>
+          <a:xfrm>
+            <a:off x="435600" y="4975200"/>
+            <a:ext cx="11325600" cy="0"/>
+          </a:xfrm>
+          <a:prstGeom prst="line">
+            <a:avLst/>
+          </a:prstGeom>
+          <a:ln w="12700">
+            <a:solidFill>
+              <a:srgbClr val="969696"/>
+            </a:solidFill>
+          </a:ln>
+          <a:effectLst/>
+        </p:spPr>
+        <p:style>
+          <a:lnRef idx="2">
+            <a:schemeClr val="accent1"/>
+          </a:lnRef>
+          <a:fillRef idx="0">
+            <a:schemeClr val="accent1"/>
+          </a:fillRef>
+          <a:effectRef idx="1">
+            <a:schemeClr val="accent1"/>
+          </a:effectRef>
+          <a:fontRef idx="minor">
+            <a:schemeClr val="tx1"/>
+          </a:fontRef>
+        </p:style>
+      </p:cxnSp>
+      <p:cxnSp>
+        <p:nvCxnSpPr>
+          <p:cNvPr id="13" name="Connector 12"/>
+          <p:cNvCxnSpPr/>
+          <p:nvPr/>
+        </p:nvCxnSpPr>
+        <p:spPr>
+          <a:xfrm>
+            <a:off x="435600" y="5774400"/>
+            <a:ext cx="11325600" cy="0"/>
+          </a:xfrm>
+          <a:prstGeom prst="line">
+            <a:avLst/>
+          </a:prstGeom>
+          <a:ln w="12700">
+            <a:solidFill>
+              <a:srgbClr val="969696"/>
+            </a:solidFill>
+          </a:ln>
+          <a:effectLst/>
+        </p:spPr>
+        <p:style>
+          <a:lnRef idx="2">
+            <a:schemeClr val="accent1"/>
+          </a:lnRef>
+          <a:fillRef idx="0">
+            <a:schemeClr val="accent1"/>
+          </a:fillRef>
+          <a:effectRef idx="1">
+            <a:schemeClr val="accent1"/>
+          </a:effectRef>
+          <a:fontRef idx="minor">
+            <a:schemeClr val="tx1"/>
+          </a:fontRef>
+        </p:style>
+      </p:cxnSp>
+      <p:cxnSp>
+        <p:nvCxnSpPr>
+          <p:cNvPr id="14" name="Connector 13"/>
+          <p:cNvCxnSpPr/>
+          <p:nvPr/>
+        </p:nvCxnSpPr>
+        <p:spPr>
+          <a:xfrm>
+            <a:off x="345600" y="1105200"/>
+            <a:ext cx="1206000" cy="0"/>
+          </a:xfrm>
+          <a:prstGeom prst="line">
+            <a:avLst/>
+          </a:prstGeom>
+          <a:ln w="25400">
+            <a:solidFill>
+              <a:srgbClr val="000000"/>
+            </a:solidFill>
+          </a:ln>
+          <a:effectLst/>
+        </p:spPr>
+        <p:style>
+          <a:lnRef idx="2">
+            <a:schemeClr val="accent1"/>
+          </a:lnRef>
+          <a:fillRef idx="0">
+            <a:schemeClr val="accent1"/>
+          </a:fillRef>
+          <a:effectRef idx="1">
+            <a:schemeClr val="accent1"/>
+          </a:effectRef>
+          <a:fontRef idx="minor">
+            <a:schemeClr val="tx1"/>
+          </a:fontRef>
+        </p:style>
+      </p:cxnSp>
+      <p:cxnSp>
+        <p:nvCxnSpPr>
+          <p:cNvPr id="15" name="Connector 14"/>
+          <p:cNvCxnSpPr/>
+          <p:nvPr/>
+        </p:nvCxnSpPr>
+        <p:spPr>
+          <a:xfrm>
+            <a:off x="1645200" y="1105200"/>
+            <a:ext cx="1206000" cy="0"/>
+          </a:xfrm>
+          <a:prstGeom prst="line">
+            <a:avLst/>
+          </a:prstGeom>
+          <a:ln w="25400">
+            <a:solidFill>
+              <a:srgbClr val="000000"/>
+            </a:solidFill>
+          </a:ln>
+          <a:effectLst/>
+        </p:spPr>
+        <p:style>
+          <a:lnRef idx="2">
+            <a:schemeClr val="accent1"/>
+          </a:lnRef>
+          <a:fillRef idx="0">
+            <a:schemeClr val="accent1"/>
+          </a:fillRef>
+          <a:effectRef idx="1">
+            <a:schemeClr val="accent1"/>
+          </a:effectRef>
+          <a:fontRef idx="minor">
+            <a:schemeClr val="tx1"/>
+          </a:fontRef>
+        </p:style>
+      </p:cxnSp>
+      <p:cxnSp>
+        <p:nvCxnSpPr>
+          <p:cNvPr id="16" name="Connector 15"/>
+          <p:cNvCxnSpPr/>
+          <p:nvPr/>
+        </p:nvCxnSpPr>
+        <p:spPr>
+          <a:xfrm>
+            <a:off x="2944800" y="1105200"/>
+            <a:ext cx="1206000" cy="0"/>
+          </a:xfrm>
+          <a:prstGeom prst="line">
+            <a:avLst/>
+          </a:prstGeom>
+          <a:ln w="25400">
+            <a:solidFill>
+              <a:srgbClr val="000000"/>
+            </a:solidFill>
+          </a:ln>
+          <a:effectLst/>
+        </p:spPr>
+        <p:style>
+          <a:lnRef idx="2">
+            <a:schemeClr val="accent1"/>
+          </a:lnRef>
+          <a:fillRef idx="0">
+            <a:schemeClr val="accent1"/>
+          </a:fillRef>
+          <a:effectRef idx="1">
+            <a:schemeClr val="accent1"/>
+          </a:effectRef>
+          <a:fontRef idx="minor">
+            <a:schemeClr val="tx1"/>
+          </a:fontRef>
+        </p:style>
+      </p:cxnSp>
+      <p:cxnSp>
+        <p:nvCxnSpPr>
+          <p:cNvPr id="17" name="Connector 16"/>
+          <p:cNvCxnSpPr/>
+          <p:nvPr/>
+        </p:nvCxnSpPr>
+        <p:spPr>
+          <a:xfrm>
+            <a:off x="4230000" y="1105200"/>
+            <a:ext cx="3528000" cy="0"/>
+          </a:xfrm>
+          <a:prstGeom prst="line">
+            <a:avLst/>
+          </a:prstGeom>
+          <a:ln w="25400">
+            <a:solidFill>
+              <a:srgbClr val="000000"/>
+            </a:solidFill>
+          </a:ln>
+          <a:effectLst/>
+        </p:spPr>
+        <p:style>
+          <a:lnRef idx="2">
+            <a:schemeClr val="accent1"/>
+          </a:lnRef>
+          <a:fillRef idx="0">
+            <a:schemeClr val="accent1"/>
+          </a:fillRef>
+          <a:effectRef idx="1">
+            <a:schemeClr val="accent1"/>
+          </a:effectRef>
+          <a:fontRef idx="minor">
+            <a:schemeClr val="tx1"/>
+          </a:fontRef>
+        </p:style>
+      </p:cxnSp>
+      <p:cxnSp>
+        <p:nvCxnSpPr>
+          <p:cNvPr id="18" name="Connector 17"/>
+          <p:cNvCxnSpPr/>
+          <p:nvPr/>
+        </p:nvCxnSpPr>
+        <p:spPr>
+          <a:xfrm>
+            <a:off x="7920000" y="1105200"/>
+            <a:ext cx="3938400" cy="0"/>
+          </a:xfrm>
+          <a:prstGeom prst="line">
+            <a:avLst/>
+          </a:prstGeom>
+          <a:ln w="25400">
+            <a:solidFill>
+              <a:srgbClr val="000000"/>
+            </a:solidFill>
+          </a:ln>
+          <a:effectLst/>
+        </p:spPr>
+        <p:style>
+          <a:lnRef idx="2">
+            <a:schemeClr val="accent1"/>
+          </a:lnRef>
+          <a:fillRef idx="0">
+            <a:schemeClr val="accent1"/>
+          </a:fillRef>
+          <a:effectRef idx="1">
+            <a:schemeClr val="accent1"/>
+          </a:effectRef>
+          <a:fontRef idx="minor">
+            <a:schemeClr val="tx1"/>
+          </a:fontRef>
+        </p:style>
+      </p:cxnSp>
+      <p:sp>
+        <p:nvSpPr>
+          <p:cNvPr id="19" name="TextBox 18"/>
+          <p:cNvSpPr txBox="1"/>
+          <p:nvPr/>
+        </p:nvSpPr>
+        <p:spPr>
+          <a:xfrm>
             <a:off x="435600" y="1360800"/>
             <a:ext cx="1076400" cy="252000"/>
           </a:xfrm>
@@ -9123,6 +10443,7 @@
           </a:bodyPr>
           <a:lstStyle/>
           <a:p>
+            <a:pPr algn="ctr"/>
             <a:r>
               <a:rPr sz="1050" b="0" i="0">
                 <a:solidFill>
@@ -9137,7 +10458,7 @@
       </p:sp>
       <p:sp>
         <p:nvSpPr>
-          <p:cNvPr id="3" name="TextBox 2"/>
+          <p:cNvPr id="20" name="TextBox 19"/>
           <p:cNvSpPr txBox="1"/>
           <p:nvPr/>
         </p:nvSpPr>
@@ -9157,6 +10478,7 @@
           </a:bodyPr>
           <a:lstStyle/>
           <a:p>
+            <a:pPr algn="ctr"/>
             <a:r>
               <a:rPr sz="1050" b="0" i="0">
                 <a:solidFill>
@@ -9171,7 +10493,7 @@
       </p:sp>
       <p:sp>
         <p:nvSpPr>
-          <p:cNvPr id="4" name="TextBox 3"/>
+          <p:cNvPr id="21" name="TextBox 20"/>
           <p:cNvSpPr txBox="1"/>
           <p:nvPr/>
         </p:nvSpPr>
@@ -9191,6 +10513,7 @@
           </a:bodyPr>
           <a:lstStyle/>
           <a:p>
+            <a:pPr algn="ctr"/>
             <a:r>
               <a:rPr sz="1050" b="0" i="0">
                 <a:solidFill>
@@ -9205,7 +10528,7 @@
       </p:sp>
       <p:sp>
         <p:nvSpPr>
-          <p:cNvPr id="5" name="TextBox 4"/>
+          <p:cNvPr id="22" name="TextBox 21"/>
           <p:cNvSpPr txBox="1"/>
           <p:nvPr/>
         </p:nvSpPr>
@@ -9225,6 +10548,7 @@
           </a:bodyPr>
           <a:lstStyle/>
           <a:p>
+            <a:pPr algn="ctr"/>
             <a:r>
               <a:rPr sz="900" b="0" i="0">
                 <a:solidFill>
@@ -9240,7 +10564,7 @@
       </p:sp>
       <p:sp>
         <p:nvSpPr>
-          <p:cNvPr id="6" name="TextBox 5"/>
+          <p:cNvPr id="23" name="TextBox 22"/>
           <p:cNvSpPr txBox="1"/>
           <p:nvPr/>
         </p:nvSpPr>
@@ -9260,6 +10584,7 @@
           </a:bodyPr>
           <a:lstStyle/>
           <a:p>
+            <a:pPr algn="ctr"/>
             <a:r>
               <a:rPr sz="900" b="0" i="0">
                 <a:solidFill>
@@ -9275,7 +10600,7 @@
       </p:sp>
       <p:sp>
         <p:nvSpPr>
-          <p:cNvPr id="7" name="TextBox 6"/>
+          <p:cNvPr id="24" name="TextBox 23"/>
           <p:cNvSpPr txBox="1"/>
           <p:nvPr/>
         </p:nvSpPr>
@@ -9295,6 +10620,7 @@
           </a:bodyPr>
           <a:lstStyle/>
           <a:p>
+            <a:pPr algn="ctr"/>
             <a:r>
               <a:rPr sz="900" b="0" i="0">
                 <a:solidFill>
@@ -9310,7 +10636,7 @@
       </p:sp>
       <p:sp>
         <p:nvSpPr>
-          <p:cNvPr id="8" name="TextBox 7"/>
+          <p:cNvPr id="25" name="TextBox 24"/>
           <p:cNvSpPr txBox="1"/>
           <p:nvPr/>
         </p:nvSpPr>
@@ -9330,6 +10656,7 @@
           </a:bodyPr>
           <a:lstStyle/>
           <a:p>
+            <a:pPr algn="ctr"/>
             <a:r>
               <a:rPr sz="900" b="0" i="0">
                 <a:solidFill>
@@ -9345,7 +10672,7 @@
       </p:sp>
       <p:sp>
         <p:nvSpPr>
-          <p:cNvPr id="9" name="TextBox 8"/>
+          <p:cNvPr id="26" name="TextBox 25"/>
           <p:cNvSpPr txBox="1"/>
           <p:nvPr/>
         </p:nvSpPr>
@@ -9365,6 +10692,7 @@
           </a:bodyPr>
           <a:lstStyle/>
           <a:p>
+            <a:pPr algn="ctr"/>
             <a:r>
               <a:rPr sz="900" b="0" i="0">
                 <a:solidFill>
@@ -9380,7 +10708,7 @@
       </p:sp>
       <p:sp>
         <p:nvSpPr>
-          <p:cNvPr id="10" name="TextBox 9"/>
+          <p:cNvPr id="27" name="TextBox 26"/>
           <p:cNvSpPr txBox="1"/>
           <p:nvPr/>
         </p:nvSpPr>
@@ -9400,6 +10728,7 @@
           </a:bodyPr>
           <a:lstStyle/>
           <a:p>
+            <a:pPr algn="ctr"/>
             <a:r>
               <a:rPr sz="900" b="0" i="0">
                 <a:solidFill>
@@ -9415,7 +10744,7 @@
       </p:sp>
       <p:sp>
         <p:nvSpPr>
-          <p:cNvPr id="11" name="TextBox 10"/>
+          <p:cNvPr id="28" name="TextBox 27"/>
           <p:cNvSpPr txBox="1"/>
           <p:nvPr/>
         </p:nvSpPr>
@@ -9435,6 +10764,7 @@
           </a:bodyPr>
           <a:lstStyle/>
           <a:p>
+            <a:pPr algn="ctr"/>
             <a:r>
               <a:rPr sz="1050" b="0" i="0">
                 <a:solidFill>
@@ -9449,7 +10779,7 @@
       </p:sp>
       <p:sp>
         <p:nvSpPr>
-          <p:cNvPr id="12" name="TextBox 11"/>
+          <p:cNvPr id="29" name="TextBox 28"/>
           <p:cNvSpPr txBox="1"/>
           <p:nvPr/>
         </p:nvSpPr>
@@ -9469,6 +10799,7 @@
           </a:bodyPr>
           <a:lstStyle/>
           <a:p>
+            <a:pPr algn="ctr"/>
             <a:r>
               <a:rPr sz="1050" b="0" i="0">
                 <a:solidFill>
@@ -9483,7 +10814,7 @@
       </p:sp>
       <p:sp>
         <p:nvSpPr>
-          <p:cNvPr id="13" name="TextBox 12"/>
+          <p:cNvPr id="30" name="TextBox 29"/>
           <p:cNvSpPr txBox="1"/>
           <p:nvPr/>
         </p:nvSpPr>
@@ -9503,6 +10834,7 @@
           </a:bodyPr>
           <a:lstStyle/>
           <a:p>
+            <a:pPr algn="ctr"/>
             <a:r>
               <a:rPr sz="1050" b="0" i="0">
                 <a:solidFill>
@@ -9517,7 +10849,7 @@
       </p:sp>
       <p:sp>
         <p:nvSpPr>
-          <p:cNvPr id="14" name="TextBox 13"/>
+          <p:cNvPr id="31" name="TextBox 30"/>
           <p:cNvSpPr txBox="1"/>
           <p:nvPr/>
         </p:nvSpPr>
@@ -9537,6 +10869,7 @@
           </a:bodyPr>
           <a:lstStyle/>
           <a:p>
+            <a:pPr algn="ctr"/>
             <a:r>
               <a:rPr sz="900" b="0" i="0">
                 <a:solidFill>
@@ -9552,7 +10885,7 @@
       </p:sp>
       <p:sp>
         <p:nvSpPr>
-          <p:cNvPr id="15" name="TextBox 14"/>
+          <p:cNvPr id="32" name="TextBox 31"/>
           <p:cNvSpPr txBox="1"/>
           <p:nvPr/>
         </p:nvSpPr>
@@ -9572,6 +10905,7 @@
           </a:bodyPr>
           <a:lstStyle/>
           <a:p>
+            <a:pPr algn="ctr"/>
             <a:r>
               <a:rPr sz="900" b="0" i="0">
                 <a:solidFill>
@@ -9587,7 +10921,7 @@
       </p:sp>
       <p:sp>
         <p:nvSpPr>
-          <p:cNvPr id="16" name="TextBox 15"/>
+          <p:cNvPr id="33" name="TextBox 32"/>
           <p:cNvSpPr txBox="1"/>
           <p:nvPr/>
         </p:nvSpPr>
@@ -9607,6 +10941,7 @@
           </a:bodyPr>
           <a:lstStyle/>
           <a:p>
+            <a:pPr algn="ctr"/>
             <a:r>
               <a:rPr sz="900" b="0" i="0">
                 <a:solidFill>
@@ -9622,7 +10957,7 @@
       </p:sp>
       <p:sp>
         <p:nvSpPr>
-          <p:cNvPr id="17" name="TextBox 16"/>
+          <p:cNvPr id="34" name="TextBox 33"/>
           <p:cNvSpPr txBox="1"/>
           <p:nvPr/>
         </p:nvSpPr>
@@ -9642,6 +10977,7 @@
           </a:bodyPr>
           <a:lstStyle/>
           <a:p>
+            <a:pPr algn="ctr"/>
             <a:r>
               <a:rPr sz="900" b="0" i="0">
                 <a:solidFill>
@@ -9657,7 +10993,7 @@
       </p:sp>
       <p:sp>
         <p:nvSpPr>
-          <p:cNvPr id="18" name="TextBox 17"/>
+          <p:cNvPr id="35" name="TextBox 34"/>
           <p:cNvSpPr txBox="1"/>
           <p:nvPr/>
         </p:nvSpPr>
@@ -9677,6 +11013,7 @@
           </a:bodyPr>
           <a:lstStyle/>
           <a:p>
+            <a:pPr algn="ctr"/>
             <a:r>
               <a:rPr sz="900" b="0" i="0">
                 <a:solidFill>
@@ -9692,7 +11029,7 @@
       </p:sp>
       <p:sp>
         <p:nvSpPr>
-          <p:cNvPr id="19" name="TextBox 18"/>
+          <p:cNvPr id="36" name="TextBox 35"/>
           <p:cNvSpPr txBox="1"/>
           <p:nvPr/>
         </p:nvSpPr>
@@ -9712,6 +11049,7 @@
           </a:bodyPr>
           <a:lstStyle/>
           <a:p>
+            <a:pPr algn="ctr"/>
             <a:r>
               <a:rPr sz="900" b="0" i="0">
                 <a:solidFill>
@@ -9727,7 +11065,7 @@
       </p:sp>
       <p:sp>
         <p:nvSpPr>
-          <p:cNvPr id="20" name="TextBox 19"/>
+          <p:cNvPr id="37" name="TextBox 36"/>
           <p:cNvSpPr txBox="1"/>
           <p:nvPr/>
         </p:nvSpPr>
@@ -9747,6 +11085,7 @@
           </a:bodyPr>
           <a:lstStyle/>
           <a:p>
+            <a:pPr algn="ctr"/>
             <a:r>
               <a:rPr sz="1050" b="0" i="0">
                 <a:solidFill>
@@ -9761,7 +11100,7 @@
       </p:sp>
       <p:sp>
         <p:nvSpPr>
-          <p:cNvPr id="21" name="TextBox 20"/>
+          <p:cNvPr id="38" name="TextBox 37"/>
           <p:cNvSpPr txBox="1"/>
           <p:nvPr/>
         </p:nvSpPr>
@@ -9781,6 +11120,7 @@
           </a:bodyPr>
           <a:lstStyle/>
           <a:p>
+            <a:pPr algn="ctr"/>
             <a:r>
               <a:rPr sz="1050" b="0" i="0">
                 <a:solidFill>
@@ -9795,7 +11135,7 @@
       </p:sp>
       <p:sp>
         <p:nvSpPr>
-          <p:cNvPr id="22" name="TextBox 21"/>
+          <p:cNvPr id="39" name="TextBox 38"/>
           <p:cNvSpPr txBox="1"/>
           <p:nvPr/>
         </p:nvSpPr>
@@ -9815,6 +11155,7 @@
           </a:bodyPr>
           <a:lstStyle/>
           <a:p>
+            <a:pPr algn="ctr"/>
             <a:r>
               <a:rPr sz="1050" b="0" i="0">
                 <a:solidFill>
@@ -9829,7 +11170,7 @@
       </p:sp>
       <p:sp>
         <p:nvSpPr>
-          <p:cNvPr id="23" name="TextBox 22"/>
+          <p:cNvPr id="40" name="TextBox 39"/>
           <p:cNvSpPr txBox="1"/>
           <p:nvPr/>
         </p:nvSpPr>
@@ -9849,6 +11190,7 @@
           </a:bodyPr>
           <a:lstStyle/>
           <a:p>
+            <a:pPr algn="ctr"/>
             <a:r>
               <a:rPr sz="900" b="0" i="0">
                 <a:solidFill>
@@ -9864,7 +11206,7 @@
       </p:sp>
       <p:sp>
         <p:nvSpPr>
-          <p:cNvPr id="24" name="TextBox 23"/>
+          <p:cNvPr id="41" name="TextBox 40"/>
           <p:cNvSpPr txBox="1"/>
           <p:nvPr/>
         </p:nvSpPr>
@@ -9884,6 +11226,7 @@
           </a:bodyPr>
           <a:lstStyle/>
           <a:p>
+            <a:pPr algn="ctr"/>
             <a:r>
               <a:rPr sz="900" b="0" i="0">
                 <a:solidFill>
@@ -9899,7 +11242,7 @@
       </p:sp>
       <p:sp>
         <p:nvSpPr>
-          <p:cNvPr id="25" name="TextBox 24"/>
+          <p:cNvPr id="42" name="TextBox 41"/>
           <p:cNvSpPr txBox="1"/>
           <p:nvPr/>
         </p:nvSpPr>
@@ -9919,6 +11262,7 @@
           </a:bodyPr>
           <a:lstStyle/>
           <a:p>
+            <a:pPr algn="ctr"/>
             <a:r>
               <a:rPr sz="900" b="0" i="0">
                 <a:solidFill>
@@ -9934,7 +11278,7 @@
       </p:sp>
       <p:sp>
         <p:nvSpPr>
-          <p:cNvPr id="26" name="TextBox 25"/>
+          <p:cNvPr id="43" name="TextBox 42"/>
           <p:cNvSpPr txBox="1"/>
           <p:nvPr/>
         </p:nvSpPr>
@@ -9954,6 +11298,7 @@
           </a:bodyPr>
           <a:lstStyle/>
           <a:p>
+            <a:pPr algn="ctr"/>
             <a:r>
               <a:rPr sz="900" b="0" i="0">
                 <a:solidFill>
@@ -9969,7 +11314,7 @@
       </p:sp>
       <p:sp>
         <p:nvSpPr>
-          <p:cNvPr id="27" name="TextBox 26"/>
+          <p:cNvPr id="44" name="TextBox 43"/>
           <p:cNvSpPr txBox="1"/>
           <p:nvPr/>
         </p:nvSpPr>
@@ -9989,6 +11334,7 @@
           </a:bodyPr>
           <a:lstStyle/>
           <a:p>
+            <a:pPr algn="ctr"/>
             <a:r>
               <a:rPr sz="900" b="0" i="0">
                 <a:solidFill>
@@ -10004,7 +11350,7 @@
       </p:sp>
       <p:sp>
         <p:nvSpPr>
-          <p:cNvPr id="28" name="TextBox 27"/>
+          <p:cNvPr id="45" name="TextBox 44"/>
           <p:cNvSpPr txBox="1"/>
           <p:nvPr/>
         </p:nvSpPr>
@@ -10024,6 +11370,7 @@
           </a:bodyPr>
           <a:lstStyle/>
           <a:p>
+            <a:pPr algn="ctr"/>
             <a:r>
               <a:rPr sz="900" b="0" i="0">
                 <a:solidFill>

</xml_diff>